<commit_message>
weather data exploration done
</commit_message>
<xml_diff>
--- a/Weather_vs_Crime.pptx
+++ b/Weather_vs_Crime.pptx
@@ -9,10 +9,11 @@
     <p:sldId id="260" r:id="rId3"/>
     <p:sldId id="257" r:id="rId4"/>
     <p:sldId id="258" r:id="rId5"/>
-    <p:sldId id="262" r:id="rId6"/>
-    <p:sldId id="261" r:id="rId7"/>
-    <p:sldId id="263" r:id="rId8"/>
-    <p:sldId id="264" r:id="rId9"/>
+    <p:sldId id="265" r:id="rId6"/>
+    <p:sldId id="262" r:id="rId7"/>
+    <p:sldId id="261" r:id="rId8"/>
+    <p:sldId id="263" r:id="rId9"/>
+    <p:sldId id="264" r:id="rId10"/>
   </p:sldIdLst>
   <p:sldSz cx="12192000" cy="6858000"/>
   <p:notesSz cx="6858000" cy="9144000"/>
@@ -3724,7 +3725,7 @@
           <a:p>
             <a:r>
               <a:rPr lang="en-US" sz="2000" dirty="0"/>
-              <a:t>With a jump in avg. high temperature of as little as 10 degrees, crime will jump 5%.</a:t>
+              <a:t>Of the weather metrics looked at, temperature will have the strongest, positive correlation to crime.</a:t>
             </a:r>
           </a:p>
         </p:txBody>
@@ -4185,8 +4186,8 @@
         </p:nvSpPr>
         <p:spPr>
           <a:xfrm>
-            <a:off x="4965431" y="2438400"/>
-            <a:ext cx="6586489" cy="3785419"/>
+            <a:off x="4965431" y="2149642"/>
+            <a:ext cx="6586489" cy="4411579"/>
           </a:xfrm>
         </p:spPr>
         <p:txBody>
@@ -4196,6 +4197,89 @@
           <a:lstStyle/>
           <a:p>
             <a:pPr indent="-228600">
+              <a:buFont typeface="Arial" panose="020B0604020202020204" pitchFamily="34" charset="0"/>
+              <a:buChar char="•"/>
+            </a:pPr>
+            <a:r>
+              <a:rPr lang="en-US" sz="2400" dirty="0"/>
+              <a:t>JSON file provided easy handling of data</a:t>
+            </a:r>
+          </a:p>
+          <a:p>
+            <a:pPr lvl="1" indent="-228600">
+              <a:buFont typeface="Arial" panose="020B0604020202020204" pitchFamily="34" charset="0"/>
+              <a:buChar char="•"/>
+            </a:pPr>
+            <a:r>
+              <a:rPr lang="en-US" sz="2200" dirty="0"/>
+              <a:t>Feeling loopy</a:t>
+            </a:r>
+          </a:p>
+          <a:p>
+            <a:pPr indent="-228600">
+              <a:buFont typeface="Arial" panose="020B0604020202020204" pitchFamily="34" charset="0"/>
+              <a:buChar char="•"/>
+            </a:pPr>
+            <a:r>
+              <a:rPr lang="en-US" sz="2400" dirty="0"/>
+              <a:t>Date and Three weather metrics (Max Temp, Humidity, and Cloudiness)</a:t>
+            </a:r>
+          </a:p>
+          <a:p>
+            <a:pPr indent="-228600">
+              <a:buFont typeface="Arial" panose="020B0604020202020204" pitchFamily="34" charset="0"/>
+              <a:buChar char="•"/>
+            </a:pPr>
+            <a:endParaRPr lang="en-US" sz="2400" dirty="0"/>
+          </a:p>
+          <a:p>
+            <a:r>
+              <a:rPr lang="en-US" sz="2400" u="sng" dirty="0"/>
+              <a:t>Some Hiccups</a:t>
+            </a:r>
+          </a:p>
+          <a:p>
+            <a:pPr marL="342900" indent="-342900">
+              <a:buFont typeface="Arial" panose="020B0604020202020204" pitchFamily="34" charset="0"/>
+              <a:buChar char="•"/>
+            </a:pPr>
+            <a:r>
+              <a:rPr lang="en-US" sz="2400" dirty="0"/>
+              <a:t>JSON entries by the hour</a:t>
+            </a:r>
+          </a:p>
+          <a:p>
+            <a:pPr marL="342900" indent="-342900">
+              <a:buFont typeface="Arial" panose="020B0604020202020204" pitchFamily="34" charset="0"/>
+              <a:buChar char="•"/>
+            </a:pPr>
+            <a:r>
+              <a:rPr lang="en-US" sz="2400" dirty="0"/>
+              <a:t>Date was UNIX timestamp (1349096400)</a:t>
+            </a:r>
+          </a:p>
+          <a:p>
+            <a:pPr marL="342900" indent="-342900">
+              <a:buFont typeface="Arial" panose="020B0604020202020204" pitchFamily="34" charset="0"/>
+              <a:buChar char="•"/>
+            </a:pPr>
+            <a:r>
+              <a:rPr lang="en-US" sz="2400" dirty="0"/>
+              <a:t>Temperature in Kelvin, not Fahrenheit</a:t>
+            </a:r>
+          </a:p>
+          <a:p>
+            <a:pPr marL="342900" indent="-342900">
+              <a:buFont typeface="Arial" panose="020B0604020202020204" pitchFamily="34" charset="0"/>
+              <a:buChar char="•"/>
+            </a:pPr>
+            <a:r>
+              <a:rPr lang="en-US" sz="2400" dirty="0"/>
+              <a:t>Missing dates (8/8/2014-6/12/2015)</a:t>
+            </a:r>
+          </a:p>
+          <a:p>
+            <a:pPr marL="342900" indent="-342900">
               <a:buFont typeface="Arial" panose="020B0604020202020204" pitchFamily="34" charset="0"/>
               <a:buChar char="•"/>
             </a:pPr>
@@ -4238,7 +4322,7 @@
           <p:cNvPr id="2" name="Title 1">
             <a:extLst>
               <a:ext uri="{FF2B5EF4-FFF2-40B4-BE49-F238E27FC236}">
-                <a16:creationId xmlns:a16="http://schemas.microsoft.com/office/drawing/2014/main" id="{216623DB-C7C3-473B-83FB-CE84D12D595A}"/>
+                <a16:creationId xmlns:a16="http://schemas.microsoft.com/office/drawing/2014/main" id="{9EEBFED2-F8E6-4FD5-8CA9-DD41304B6863}"/>
               </a:ext>
             </a:extLst>
           </p:cNvPr>
@@ -4254,19 +4338,41 @@
           <a:bodyPr/>
           <a:lstStyle/>
           <a:p>
-            <a:r>
-              <a:rPr lang="en-US" dirty="0"/>
-              <a:t>The Data: Weather Exploration</a:t>
-            </a:r>
-          </a:p>
-        </p:txBody>
-      </p:sp>
-      <p:sp>
-        <p:nvSpPr>
-          <p:cNvPr id="3" name="Text Placeholder 2">
-            <a:extLst>
-              <a:ext uri="{FF2B5EF4-FFF2-40B4-BE49-F238E27FC236}">
-                <a16:creationId xmlns:a16="http://schemas.microsoft.com/office/drawing/2014/main" id="{F2DEEDE5-5314-44F3-910B-4625C22F52B3}"/>
+            <a:endParaRPr lang="en-US"/>
+          </a:p>
+        </p:txBody>
+      </p:sp>
+      <p:sp>
+        <p:nvSpPr>
+          <p:cNvPr id="3" name="Content Placeholder 2">
+            <a:extLst>
+              <a:ext uri="{FF2B5EF4-FFF2-40B4-BE49-F238E27FC236}">
+                <a16:creationId xmlns:a16="http://schemas.microsoft.com/office/drawing/2014/main" id="{30DC571F-F82A-4868-83A6-2D69B5F05EFC}"/>
+              </a:ext>
+            </a:extLst>
+          </p:cNvPr>
+          <p:cNvSpPr>
+            <a:spLocks noGrp="1"/>
+          </p:cNvSpPr>
+          <p:nvPr>
+            <p:ph idx="1"/>
+          </p:nvPr>
+        </p:nvSpPr>
+        <p:spPr/>
+        <p:txBody>
+          <a:bodyPr/>
+          <a:lstStyle/>
+          <a:p>
+            <a:endParaRPr lang="en-US"/>
+          </a:p>
+        </p:txBody>
+      </p:sp>
+      <p:sp>
+        <p:nvSpPr>
+          <p:cNvPr id="4" name="Text Placeholder 3">
+            <a:extLst>
+              <a:ext uri="{FF2B5EF4-FFF2-40B4-BE49-F238E27FC236}">
+                <a16:creationId xmlns:a16="http://schemas.microsoft.com/office/drawing/2014/main" id="{A1DD6B23-7497-4E87-A73E-4A74EE050079}"/>
               </a:ext>
             </a:extLst>
           </p:cNvPr>
@@ -4282,81 +4388,14 @@
           <a:bodyPr/>
           <a:lstStyle/>
           <a:p>
-            <a:pPr algn="ctr"/>
-            <a:endParaRPr lang="en-US" dirty="0"/>
-          </a:p>
-          <a:p>
-            <a:pPr algn="ctr"/>
-            <a:r>
-              <a:rPr lang="en-US" dirty="0"/>
-              <a:t>The Easiest Part!</a:t>
-            </a:r>
-          </a:p>
-          <a:p>
-            <a:pPr algn="ctr"/>
-            <a:endParaRPr lang="en-US" dirty="0"/>
-          </a:p>
-          <a:p>
-            <a:pPr marL="285750" indent="-285750">
-              <a:buFont typeface="Arial" panose="020B0604020202020204" pitchFamily="34" charset="0"/>
-              <a:buChar char="•"/>
-            </a:pPr>
-            <a:r>
-              <a:rPr lang="en-US" dirty="0"/>
-              <a:t>Load in the huge amounts of data</a:t>
-            </a:r>
-          </a:p>
-          <a:p>
-            <a:pPr marL="285750" indent="-285750">
-              <a:buFont typeface="Arial" panose="020B0604020202020204" pitchFamily="34" charset="0"/>
-              <a:buChar char="•"/>
-            </a:pPr>
-            <a:r>
-              <a:rPr lang="en-US" dirty="0"/>
-              <a:t>Extract the data we need</a:t>
-            </a:r>
-          </a:p>
-        </p:txBody>
-      </p:sp>
-      <p:pic>
-        <p:nvPicPr>
-          <p:cNvPr id="12" name="Content Placeholder 11">
-            <a:extLst>
-              <a:ext uri="{FF2B5EF4-FFF2-40B4-BE49-F238E27FC236}">
-                <a16:creationId xmlns:a16="http://schemas.microsoft.com/office/drawing/2014/main" id="{AC83D0E6-CD73-44AB-AAA0-953BA94866CE}"/>
-              </a:ext>
-            </a:extLst>
-          </p:cNvPr>
-          <p:cNvPicPr>
-            <a:picLocks noGrp="1" noChangeAspect="1"/>
-          </p:cNvPicPr>
-          <p:nvPr>
-            <p:ph idx="1"/>
-          </p:nvPr>
-        </p:nvPicPr>
-        <p:blipFill>
-          <a:blip r:embed="rId2">
-            <a:extLst>
-              <a:ext uri="{28A0092B-C50C-407E-A947-70E740481C1C}">
-                <a14:useLocalDpi xmlns:a14="http://schemas.microsoft.com/office/drawing/2010/main" val="0"/>
-              </a:ext>
-            </a:extLst>
-          </a:blip>
-          <a:stretch>
-            <a:fillRect/>
-          </a:stretch>
-        </p:blipFill>
-        <p:spPr>
-          <a:xfrm>
-            <a:off x="4772025" y="858982"/>
-            <a:ext cx="7218218" cy="5777345"/>
-          </a:xfrm>
-        </p:spPr>
-      </p:pic>
+            <a:endParaRPr lang="en-US"/>
+          </a:p>
+        </p:txBody>
+      </p:sp>
     </p:spTree>
     <p:extLst>
       <p:ext uri="{BB962C8B-B14F-4D97-AF65-F5344CB8AC3E}">
-        <p14:creationId xmlns:p14="http://schemas.microsoft.com/office/powerpoint/2010/main" val="1939522004"/>
+        <p14:creationId xmlns:p14="http://schemas.microsoft.com/office/powerpoint/2010/main" val="2874429364"/>
       </p:ext>
     </p:extLst>
   </p:cSld>
@@ -4385,10 +4424,10 @@
       </p:grpSpPr>
       <p:sp>
         <p:nvSpPr>
-          <p:cNvPr id="7" name="Title 6">
-            <a:extLst>
-              <a:ext uri="{FF2B5EF4-FFF2-40B4-BE49-F238E27FC236}">
-                <a16:creationId xmlns:a16="http://schemas.microsoft.com/office/drawing/2014/main" id="{E5886D5D-4559-4000-A1C0-2CB15F99BCF8}"/>
+          <p:cNvPr id="2" name="Title 1">
+            <a:extLst>
+              <a:ext uri="{FF2B5EF4-FFF2-40B4-BE49-F238E27FC236}">
+                <a16:creationId xmlns:a16="http://schemas.microsoft.com/office/drawing/2014/main" id="{216623DB-C7C3-473B-83FB-CE84D12D595A}"/>
               </a:ext>
             </a:extLst>
           </p:cNvPr>
@@ -4406,17 +4445,17 @@
           <a:p>
             <a:r>
               <a:rPr lang="en-US" dirty="0"/>
-              <a:t>The Data: Crime Exploration</a:t>
-            </a:r>
-          </a:p>
-        </p:txBody>
-      </p:sp>
-      <p:sp>
-        <p:nvSpPr>
-          <p:cNvPr id="9" name="Text Placeholder 8">
-            <a:extLst>
-              <a:ext uri="{FF2B5EF4-FFF2-40B4-BE49-F238E27FC236}">
-                <a16:creationId xmlns:a16="http://schemas.microsoft.com/office/drawing/2014/main" id="{2A5DCE34-3430-4E62-8A30-9AE926A8B029}"/>
+              <a:t>The Data: Weather Exploration</a:t>
+            </a:r>
+          </a:p>
+        </p:txBody>
+      </p:sp>
+      <p:sp>
+        <p:nvSpPr>
+          <p:cNvPr id="3" name="Text Placeholder 2">
+            <a:extLst>
+              <a:ext uri="{FF2B5EF4-FFF2-40B4-BE49-F238E27FC236}">
+                <a16:creationId xmlns:a16="http://schemas.microsoft.com/office/drawing/2014/main" id="{F2DEEDE5-5314-44F3-910B-4625C22F52B3}"/>
               </a:ext>
             </a:extLst>
           </p:cNvPr>
@@ -4431,21 +4470,49 @@
         <p:txBody>
           <a:bodyPr/>
           <a:lstStyle/>
-          <a:p>
-            <a:endParaRPr lang="en-US" dirty="0"/>
-          </a:p>
           <a:p>
             <a:pPr algn="ctr"/>
             <a:endParaRPr lang="en-US" dirty="0"/>
           </a:p>
+          <a:p>
+            <a:pPr algn="ctr"/>
+            <a:r>
+              <a:rPr lang="en-US" dirty="0"/>
+              <a:t>The Easiest Part!</a:t>
+            </a:r>
+          </a:p>
+          <a:p>
+            <a:pPr algn="ctr"/>
+            <a:endParaRPr lang="en-US" dirty="0"/>
+          </a:p>
+          <a:p>
+            <a:pPr marL="285750" indent="-285750">
+              <a:buFont typeface="Arial" panose="020B0604020202020204" pitchFamily="34" charset="0"/>
+              <a:buChar char="•"/>
+            </a:pPr>
+            <a:r>
+              <a:rPr lang="en-US" dirty="0"/>
+              <a:t>Load in the huge amounts of data</a:t>
+            </a:r>
+          </a:p>
+          <a:p>
+            <a:pPr marL="285750" indent="-285750">
+              <a:buFont typeface="Arial" panose="020B0604020202020204" pitchFamily="34" charset="0"/>
+              <a:buChar char="•"/>
+            </a:pPr>
+            <a:r>
+              <a:rPr lang="en-US" dirty="0"/>
+              <a:t>Extract the data we need</a:t>
+            </a:r>
+          </a:p>
         </p:txBody>
       </p:sp>
       <p:pic>
         <p:nvPicPr>
-          <p:cNvPr id="14" name="Content Placeholder 13">
-            <a:extLst>
-              <a:ext uri="{FF2B5EF4-FFF2-40B4-BE49-F238E27FC236}">
-                <a16:creationId xmlns:a16="http://schemas.microsoft.com/office/drawing/2014/main" id="{54C12D38-4A1F-497F-873B-139AB9E747CA}"/>
+          <p:cNvPr id="12" name="Content Placeholder 11">
+            <a:extLst>
+              <a:ext uri="{FF2B5EF4-FFF2-40B4-BE49-F238E27FC236}">
+                <a16:creationId xmlns:a16="http://schemas.microsoft.com/office/drawing/2014/main" id="{AC83D0E6-CD73-44AB-AAA0-953BA94866CE}"/>
               </a:ext>
             </a:extLst>
           </p:cNvPr>
@@ -4470,15 +4537,15 @@
         </p:blipFill>
         <p:spPr>
           <a:xfrm>
-            <a:off x="4935537" y="390525"/>
-            <a:ext cx="7034185" cy="6200775"/>
+            <a:off x="4772025" y="858982"/>
+            <a:ext cx="7218218" cy="5777345"/>
           </a:xfrm>
         </p:spPr>
       </p:pic>
     </p:spTree>
     <p:extLst>
       <p:ext uri="{BB962C8B-B14F-4D97-AF65-F5344CB8AC3E}">
-        <p14:creationId xmlns:p14="http://schemas.microsoft.com/office/powerpoint/2010/main" val="887106118"/>
+        <p14:creationId xmlns:p14="http://schemas.microsoft.com/office/powerpoint/2010/main" val="1939522004"/>
       </p:ext>
     </p:extLst>
   </p:cSld>
@@ -4528,6 +4595,128 @@
           <a:p>
             <a:r>
               <a:rPr lang="en-US" dirty="0"/>
+              <a:t>The Data: Crime Exploration</a:t>
+            </a:r>
+          </a:p>
+        </p:txBody>
+      </p:sp>
+      <p:sp>
+        <p:nvSpPr>
+          <p:cNvPr id="9" name="Text Placeholder 8">
+            <a:extLst>
+              <a:ext uri="{FF2B5EF4-FFF2-40B4-BE49-F238E27FC236}">
+                <a16:creationId xmlns:a16="http://schemas.microsoft.com/office/drawing/2014/main" id="{2A5DCE34-3430-4E62-8A30-9AE926A8B029}"/>
+              </a:ext>
+            </a:extLst>
+          </p:cNvPr>
+          <p:cNvSpPr>
+            <a:spLocks noGrp="1"/>
+          </p:cNvSpPr>
+          <p:nvPr>
+            <p:ph type="body" sz="half" idx="2"/>
+          </p:nvPr>
+        </p:nvSpPr>
+        <p:spPr/>
+        <p:txBody>
+          <a:bodyPr/>
+          <a:lstStyle/>
+          <a:p>
+            <a:endParaRPr lang="en-US" dirty="0"/>
+          </a:p>
+          <a:p>
+            <a:pPr algn="ctr"/>
+            <a:endParaRPr lang="en-US" dirty="0"/>
+          </a:p>
+        </p:txBody>
+      </p:sp>
+      <p:pic>
+        <p:nvPicPr>
+          <p:cNvPr id="14" name="Content Placeholder 13">
+            <a:extLst>
+              <a:ext uri="{FF2B5EF4-FFF2-40B4-BE49-F238E27FC236}">
+                <a16:creationId xmlns:a16="http://schemas.microsoft.com/office/drawing/2014/main" id="{54C12D38-4A1F-497F-873B-139AB9E747CA}"/>
+              </a:ext>
+            </a:extLst>
+          </p:cNvPr>
+          <p:cNvPicPr>
+            <a:picLocks noGrp="1" noChangeAspect="1"/>
+          </p:cNvPicPr>
+          <p:nvPr>
+            <p:ph idx="1"/>
+          </p:nvPr>
+        </p:nvPicPr>
+        <p:blipFill>
+          <a:blip r:embed="rId2">
+            <a:extLst>
+              <a:ext uri="{28A0092B-C50C-407E-A947-70E740481C1C}">
+                <a14:useLocalDpi xmlns:a14="http://schemas.microsoft.com/office/drawing/2010/main" val="0"/>
+              </a:ext>
+            </a:extLst>
+          </a:blip>
+          <a:stretch>
+            <a:fillRect/>
+          </a:stretch>
+        </p:blipFill>
+        <p:spPr>
+          <a:xfrm>
+            <a:off x="4935537" y="390525"/>
+            <a:ext cx="7034185" cy="6200775"/>
+          </a:xfrm>
+        </p:spPr>
+      </p:pic>
+    </p:spTree>
+    <p:extLst>
+      <p:ext uri="{BB962C8B-B14F-4D97-AF65-F5344CB8AC3E}">
+        <p14:creationId xmlns:p14="http://schemas.microsoft.com/office/powerpoint/2010/main" val="887106118"/>
+      </p:ext>
+    </p:extLst>
+  </p:cSld>
+  <p:clrMapOvr>
+    <a:masterClrMapping/>
+  </p:clrMapOvr>
+</p:sld>
+</file>
+
+<file path=ppt/slides/slide8.xml><?xml version="1.0" encoding="utf-8"?>
+<p:sld xmlns:a="http://schemas.openxmlformats.org/drawingml/2006/main" xmlns:r="http://schemas.openxmlformats.org/officeDocument/2006/relationships" xmlns:p="http://schemas.openxmlformats.org/presentationml/2006/main">
+  <p:cSld>
+    <p:spTree>
+      <p:nvGrpSpPr>
+        <p:cNvPr id="1" name=""/>
+        <p:cNvGrpSpPr/>
+        <p:nvPr/>
+      </p:nvGrpSpPr>
+      <p:grpSpPr>
+        <a:xfrm>
+          <a:off x="0" y="0"/>
+          <a:ext cx="0" cy="0"/>
+          <a:chOff x="0" y="0"/>
+          <a:chExt cx="0" cy="0"/>
+        </a:xfrm>
+      </p:grpSpPr>
+      <p:sp>
+        <p:nvSpPr>
+          <p:cNvPr id="7" name="Title 6">
+            <a:extLst>
+              <a:ext uri="{FF2B5EF4-FFF2-40B4-BE49-F238E27FC236}">
+                <a16:creationId xmlns:a16="http://schemas.microsoft.com/office/drawing/2014/main" id="{E5886D5D-4559-4000-A1C0-2CB15F99BCF8}"/>
+              </a:ext>
+            </a:extLst>
+          </p:cNvPr>
+          <p:cNvSpPr>
+            <a:spLocks noGrp="1"/>
+          </p:cNvSpPr>
+          <p:nvPr>
+            <p:ph type="title"/>
+          </p:nvPr>
+        </p:nvSpPr>
+        <p:spPr/>
+        <p:txBody>
+          <a:bodyPr/>
+          <a:lstStyle/>
+          <a:p>
+            <a:r>
+              <a:rPr lang="en-US" dirty="0"/>
               <a:t>The Data: Crime Cleanup</a:t>
             </a:r>
           </a:p>
@@ -4610,7 +4799,7 @@
 </p:sld>
 </file>
 
-<file path=ppt/slides/slide8.xml><?xml version="1.0" encoding="utf-8"?>
+<file path=ppt/slides/slide9.xml><?xml version="1.0" encoding="utf-8"?>
 <p:sld xmlns:a="http://schemas.openxmlformats.org/drawingml/2006/main" xmlns:r="http://schemas.openxmlformats.org/officeDocument/2006/relationships" xmlns:p="http://schemas.openxmlformats.org/presentationml/2006/main">
   <p:cSld>
     <p:spTree>

</xml_diff>

<commit_message>
updated weather cleanup and pearson correlation in ppt
</commit_message>
<xml_diff>
--- a/Weather_vs_Crime.pptx
+++ b/Weather_vs_Crime.pptx
@@ -13,7 +13,8 @@
     <p:sldId id="262" r:id="rId7"/>
     <p:sldId id="261" r:id="rId8"/>
     <p:sldId id="263" r:id="rId9"/>
-    <p:sldId id="264" r:id="rId10"/>
+    <p:sldId id="266" r:id="rId10"/>
+    <p:sldId id="264" r:id="rId11"/>
   </p:sldIdLst>
   <p:sldSz cx="12192000" cy="6858000"/>
   <p:notesSz cx="6858000" cy="9144000"/>
@@ -3630,6 +3631,324 @@
 </p:sld>
 </file>
 
+<file path=ppt/slides/slide10.xml><?xml version="1.0" encoding="utf-8"?>
+<p:sld xmlns:a="http://schemas.openxmlformats.org/drawingml/2006/main" xmlns:r="http://schemas.openxmlformats.org/officeDocument/2006/relationships" xmlns:p="http://schemas.openxmlformats.org/presentationml/2006/main">
+  <p:cSld>
+    <p:spTree>
+      <p:nvGrpSpPr>
+        <p:cNvPr id="1" name=""/>
+        <p:cNvGrpSpPr/>
+        <p:nvPr/>
+      </p:nvGrpSpPr>
+      <p:grpSpPr>
+        <a:xfrm>
+          <a:off x="0" y="0"/>
+          <a:ext cx="0" cy="0"/>
+          <a:chOff x="0" y="0"/>
+          <a:chExt cx="0" cy="0"/>
+        </a:xfrm>
+      </p:grpSpPr>
+      <p:sp>
+        <p:nvSpPr>
+          <p:cNvPr id="5" name="Title 4">
+            <a:extLst>
+              <a:ext uri="{FF2B5EF4-FFF2-40B4-BE49-F238E27FC236}">
+                <a16:creationId xmlns:a16="http://schemas.microsoft.com/office/drawing/2014/main" id="{59B8E2D4-05F5-442D-A308-9BFFCA665FEA}"/>
+              </a:ext>
+            </a:extLst>
+          </p:cNvPr>
+          <p:cNvSpPr>
+            <a:spLocks noGrp="1"/>
+          </p:cNvSpPr>
+          <p:nvPr>
+            <p:ph type="title"/>
+          </p:nvPr>
+        </p:nvSpPr>
+        <p:spPr/>
+        <p:txBody>
+          <a:bodyPr/>
+          <a:lstStyle/>
+          <a:p>
+            <a:r>
+              <a:rPr lang="en-US" dirty="0"/>
+              <a:t>Weather &amp; Crime: Pearson Correlation</a:t>
+            </a:r>
+          </a:p>
+        </p:txBody>
+      </p:sp>
+      <p:pic>
+        <p:nvPicPr>
+          <p:cNvPr id="10" name="Content Placeholder 9" descr="A screenshot of a cell phone&#10;&#10;Description automatically generated">
+            <a:extLst>
+              <a:ext uri="{FF2B5EF4-FFF2-40B4-BE49-F238E27FC236}">
+                <a16:creationId xmlns:a16="http://schemas.microsoft.com/office/drawing/2014/main" id="{28EBD97C-D6EE-4D1A-B609-010BAF7B0271}"/>
+              </a:ext>
+            </a:extLst>
+          </p:cNvPr>
+          <p:cNvPicPr>
+            <a:picLocks noGrp="1" noChangeAspect="1"/>
+          </p:cNvPicPr>
+          <p:nvPr>
+            <p:ph idx="1"/>
+          </p:nvPr>
+        </p:nvPicPr>
+        <p:blipFill>
+          <a:blip r:embed="rId2">
+            <a:extLst>
+              <a:ext uri="{28A0092B-C50C-407E-A947-70E740481C1C}">
+                <a14:useLocalDpi xmlns:a14="http://schemas.microsoft.com/office/drawing/2010/main" val="0"/>
+              </a:ext>
+            </a:extLst>
+          </a:blip>
+          <a:stretch>
+            <a:fillRect/>
+          </a:stretch>
+        </p:blipFill>
+        <p:spPr bwMode="auto">
+          <a:xfrm>
+            <a:off x="851691" y="4010827"/>
+            <a:ext cx="3950208" cy="2504318"/>
+          </a:xfrm>
+          <a:prstGeom prst="rect">
+            <a:avLst/>
+          </a:prstGeom>
+          <a:noFill/>
+          <a:extLst>
+            <a:ext uri="{909E8E84-426E-40DD-AFC4-6F175D3DCCD1}">
+              <a14:hiddenFill xmlns:a14="http://schemas.microsoft.com/office/drawing/2010/main">
+                <a:solidFill>
+                  <a:srgbClr val="FFFFFF"/>
+                </a:solidFill>
+              </a14:hiddenFill>
+            </a:ext>
+          </a:extLst>
+        </p:spPr>
+      </p:pic>
+      <p:pic>
+        <p:nvPicPr>
+          <p:cNvPr id="12" name="Picture 11" descr="A screenshot of a cell phone&#10;&#10;Description automatically generated">
+            <a:extLst>
+              <a:ext uri="{FF2B5EF4-FFF2-40B4-BE49-F238E27FC236}">
+                <a16:creationId xmlns:a16="http://schemas.microsoft.com/office/drawing/2014/main" id="{21FD03E5-5087-4D94-A9CB-5C6613863959}"/>
+              </a:ext>
+            </a:extLst>
+          </p:cNvPr>
+          <p:cNvPicPr>
+            <a:picLocks noChangeAspect="1"/>
+          </p:cNvPicPr>
+          <p:nvPr/>
+        </p:nvPicPr>
+        <p:blipFill>
+          <a:blip r:embed="rId3">
+            <a:extLst>
+              <a:ext uri="{28A0092B-C50C-407E-A947-70E740481C1C}">
+                <a14:useLocalDpi xmlns:a14="http://schemas.microsoft.com/office/drawing/2010/main" val="0"/>
+              </a:ext>
+            </a:extLst>
+          </a:blip>
+          <a:stretch>
+            <a:fillRect/>
+          </a:stretch>
+        </p:blipFill>
+        <p:spPr>
+          <a:xfrm>
+            <a:off x="775280" y="1396339"/>
+            <a:ext cx="3948717" cy="2546010"/>
+          </a:xfrm>
+          <a:prstGeom prst="rect">
+            <a:avLst/>
+          </a:prstGeom>
+        </p:spPr>
+      </p:pic>
+      <p:pic>
+        <p:nvPicPr>
+          <p:cNvPr id="14" name="Picture 13" descr="A screenshot of a cell phone&#10;&#10;Description automatically generated">
+            <a:extLst>
+              <a:ext uri="{FF2B5EF4-FFF2-40B4-BE49-F238E27FC236}">
+                <a16:creationId xmlns:a16="http://schemas.microsoft.com/office/drawing/2014/main" id="{4BD472A3-F767-4955-BDD6-D03F31412E6D}"/>
+              </a:ext>
+            </a:extLst>
+          </p:cNvPr>
+          <p:cNvPicPr>
+            <a:picLocks noChangeAspect="1"/>
+          </p:cNvPicPr>
+          <p:nvPr/>
+        </p:nvPicPr>
+        <p:blipFill>
+          <a:blip r:embed="rId4">
+            <a:extLst>
+              <a:ext uri="{28A0092B-C50C-407E-A947-70E740481C1C}">
+                <a14:useLocalDpi xmlns:a14="http://schemas.microsoft.com/office/drawing/2010/main" val="0"/>
+              </a:ext>
+            </a:extLst>
+          </a:blip>
+          <a:stretch>
+            <a:fillRect/>
+          </a:stretch>
+        </p:blipFill>
+        <p:spPr>
+          <a:xfrm>
+            <a:off x="6427579" y="3989500"/>
+            <a:ext cx="3950208" cy="2546972"/>
+          </a:xfrm>
+          <a:prstGeom prst="rect">
+            <a:avLst/>
+          </a:prstGeom>
+        </p:spPr>
+      </p:pic>
+      <p:pic>
+        <p:nvPicPr>
+          <p:cNvPr id="16" name="Picture 15" descr="A screenshot of a cell phone&#10;&#10;Description automatically generated">
+            <a:extLst>
+              <a:ext uri="{FF2B5EF4-FFF2-40B4-BE49-F238E27FC236}">
+                <a16:creationId xmlns:a16="http://schemas.microsoft.com/office/drawing/2014/main" id="{AFE2AD58-15EF-4F34-A700-692BED185970}"/>
+              </a:ext>
+            </a:extLst>
+          </p:cNvPr>
+          <p:cNvPicPr>
+            <a:picLocks noChangeAspect="1"/>
+          </p:cNvPicPr>
+          <p:nvPr/>
+        </p:nvPicPr>
+        <p:blipFill>
+          <a:blip r:embed="rId5">
+            <a:extLst>
+              <a:ext uri="{28A0092B-C50C-407E-A947-70E740481C1C}">
+                <a14:useLocalDpi xmlns:a14="http://schemas.microsoft.com/office/drawing/2010/main" val="0"/>
+              </a:ext>
+            </a:extLst>
+          </a:blip>
+          <a:stretch>
+            <a:fillRect/>
+          </a:stretch>
+        </p:blipFill>
+        <p:spPr>
+          <a:xfrm>
+            <a:off x="6457353" y="1396339"/>
+            <a:ext cx="3950208" cy="2546972"/>
+          </a:xfrm>
+          <a:prstGeom prst="rect">
+            <a:avLst/>
+          </a:prstGeom>
+        </p:spPr>
+      </p:pic>
+      <p:sp>
+        <p:nvSpPr>
+          <p:cNvPr id="2" name="Rectangle 1">
+            <a:extLst>
+              <a:ext uri="{FF2B5EF4-FFF2-40B4-BE49-F238E27FC236}">
+                <a16:creationId xmlns:a16="http://schemas.microsoft.com/office/drawing/2014/main" id="{1FAF19C5-B19C-4514-BBCA-BAD50C3E0AE5}"/>
+              </a:ext>
+            </a:extLst>
+          </p:cNvPr>
+          <p:cNvSpPr/>
+          <p:nvPr/>
+        </p:nvSpPr>
+        <p:spPr>
+          <a:xfrm>
+            <a:off x="1491916" y="5678905"/>
+            <a:ext cx="930442" cy="813970"/>
+          </a:xfrm>
+          <a:prstGeom prst="rect">
+            <a:avLst/>
+          </a:prstGeom>
+          <a:noFill/>
+          <a:ln>
+            <a:solidFill>
+              <a:srgbClr val="00B050"/>
+            </a:solidFill>
+          </a:ln>
+        </p:spPr>
+        <p:style>
+          <a:lnRef idx="2">
+            <a:schemeClr val="accent1">
+              <a:shade val="50000"/>
+            </a:schemeClr>
+          </a:lnRef>
+          <a:fillRef idx="1">
+            <a:schemeClr val="accent1"/>
+          </a:fillRef>
+          <a:effectRef idx="0">
+            <a:schemeClr val="accent1"/>
+          </a:effectRef>
+          <a:fontRef idx="minor">
+            <a:schemeClr val="lt1"/>
+          </a:fontRef>
+        </p:style>
+        <p:txBody>
+          <a:bodyPr rtlCol="0" anchor="ctr"/>
+          <a:lstStyle/>
+          <a:p>
+            <a:pPr algn="ctr"/>
+            <a:endParaRPr lang="en-US"/>
+          </a:p>
+        </p:txBody>
+      </p:sp>
+      <p:sp>
+        <p:nvSpPr>
+          <p:cNvPr id="8" name="Rectangle 7">
+            <a:extLst>
+              <a:ext uri="{FF2B5EF4-FFF2-40B4-BE49-F238E27FC236}">
+                <a16:creationId xmlns:a16="http://schemas.microsoft.com/office/drawing/2014/main" id="{7A044601-02DC-4946-AF23-89180C0AD10D}"/>
+              </a:ext>
+            </a:extLst>
+          </p:cNvPr>
+          <p:cNvSpPr/>
+          <p:nvPr/>
+        </p:nvSpPr>
+        <p:spPr>
+          <a:xfrm>
+            <a:off x="3360821" y="4135530"/>
+            <a:ext cx="930442" cy="813970"/>
+          </a:xfrm>
+          <a:prstGeom prst="rect">
+            <a:avLst/>
+          </a:prstGeom>
+          <a:noFill/>
+          <a:ln>
+            <a:solidFill>
+              <a:srgbClr val="00B050"/>
+            </a:solidFill>
+          </a:ln>
+        </p:spPr>
+        <p:style>
+          <a:lnRef idx="2">
+            <a:schemeClr val="accent1">
+              <a:shade val="50000"/>
+            </a:schemeClr>
+          </a:lnRef>
+          <a:fillRef idx="1">
+            <a:schemeClr val="accent1"/>
+          </a:fillRef>
+          <a:effectRef idx="0">
+            <a:schemeClr val="accent1"/>
+          </a:effectRef>
+          <a:fontRef idx="minor">
+            <a:schemeClr val="lt1"/>
+          </a:fontRef>
+        </p:style>
+        <p:txBody>
+          <a:bodyPr rtlCol="0" anchor="ctr"/>
+          <a:lstStyle/>
+          <a:p>
+            <a:pPr algn="ctr"/>
+            <a:endParaRPr lang="en-US"/>
+          </a:p>
+        </p:txBody>
+      </p:sp>
+    </p:spTree>
+    <p:extLst>
+      <p:ext uri="{BB962C8B-B14F-4D97-AF65-F5344CB8AC3E}">
+        <p14:creationId xmlns:p14="http://schemas.microsoft.com/office/powerpoint/2010/main" val="918526572"/>
+      </p:ext>
+    </p:extLst>
+  </p:cSld>
+  <p:clrMapOvr>
+    <a:masterClrMapping/>
+  </p:clrMapOvr>
+</p:sld>
+</file>
+
 <file path=ppt/slides/slide2.xml><?xml version="1.0" encoding="utf-8"?>
 <p:sld xmlns:a="http://schemas.openxmlformats.org/drawingml/2006/main" xmlns:r="http://schemas.openxmlformats.org/officeDocument/2006/relationships" xmlns:p="http://schemas.openxmlformats.org/presentationml/2006/main">
   <p:cSld>
@@ -4245,7 +4564,7 @@
             </a:pPr>
             <a:r>
               <a:rPr lang="en-US" sz="2400" dirty="0"/>
-              <a:t>JSON entries by the hour</a:t>
+              <a:t>Date was UNIX timestamp (1349096400)</a:t>
             </a:r>
           </a:p>
           <a:p>
@@ -4255,7 +4574,7 @@
             </a:pPr>
             <a:r>
               <a:rPr lang="en-US" sz="2400" dirty="0"/>
-              <a:t>Date was UNIX timestamp (1349096400)</a:t>
+              <a:t>JSON entries by the hour</a:t>
             </a:r>
           </a:p>
           <a:p>
@@ -4335,35 +4654,15 @@
         </p:nvSpPr>
         <p:spPr/>
         <p:txBody>
-          <a:bodyPr/>
-          <a:lstStyle/>
-          <a:p>
-            <a:endParaRPr lang="en-US"/>
-          </a:p>
-        </p:txBody>
-      </p:sp>
-      <p:sp>
-        <p:nvSpPr>
-          <p:cNvPr id="3" name="Content Placeholder 2">
-            <a:extLst>
-              <a:ext uri="{FF2B5EF4-FFF2-40B4-BE49-F238E27FC236}">
-                <a16:creationId xmlns:a16="http://schemas.microsoft.com/office/drawing/2014/main" id="{30DC571F-F82A-4868-83A6-2D69B5F05EFC}"/>
-              </a:ext>
-            </a:extLst>
-          </p:cNvPr>
-          <p:cNvSpPr>
-            <a:spLocks noGrp="1"/>
-          </p:cNvSpPr>
-          <p:nvPr>
-            <p:ph idx="1"/>
-          </p:nvPr>
-        </p:nvSpPr>
-        <p:spPr/>
-        <p:txBody>
-          <a:bodyPr/>
-          <a:lstStyle/>
-          <a:p>
-            <a:endParaRPr lang="en-US"/>
+          <a:bodyPr>
+            <a:normAutofit fontScale="90000"/>
+          </a:bodyPr>
+          <a:lstStyle/>
+          <a:p>
+            <a:r>
+              <a:rPr lang="en-US" sz="4400" dirty="0"/>
+              <a:t>The Data: Weather Cleanup</a:t>
+            </a:r>
           </a:p>
         </p:txBody>
       </p:sp>
@@ -4383,15 +4682,475 @@
             <p:ph type="body" sz="half" idx="2"/>
           </p:nvPr>
         </p:nvSpPr>
-        <p:spPr/>
-        <p:txBody>
-          <a:bodyPr/>
-          <a:lstStyle/>
-          <a:p>
-            <a:endParaRPr lang="en-US"/>
-          </a:p>
-        </p:txBody>
-      </p:sp>
+        <p:spPr>
+          <a:xfrm>
+            <a:off x="839788" y="2057400"/>
+            <a:ext cx="10512424" cy="3811588"/>
+          </a:xfrm>
+        </p:spPr>
+        <p:txBody>
+          <a:bodyPr numCol="3">
+            <a:normAutofit/>
+          </a:bodyPr>
+          <a:lstStyle/>
+          <a:p>
+            <a:pPr>
+              <a:lnSpc>
+                <a:spcPct val="250000"/>
+              </a:lnSpc>
+            </a:pPr>
+            <a:r>
+              <a:rPr lang="en-US" sz="2000" dirty="0"/>
+              <a:t>UNIX timestamp</a:t>
+            </a:r>
+          </a:p>
+          <a:p>
+            <a:pPr>
+              <a:lnSpc>
+                <a:spcPct val="250000"/>
+              </a:lnSpc>
+            </a:pPr>
+            <a:r>
+              <a:rPr lang="en-US" sz="2000" dirty="0"/>
+              <a:t>Hourly JSON entries</a:t>
+            </a:r>
+          </a:p>
+          <a:p>
+            <a:pPr>
+              <a:lnSpc>
+                <a:spcPct val="250000"/>
+              </a:lnSpc>
+            </a:pPr>
+            <a:r>
+              <a:rPr lang="en-US" sz="2000" dirty="0"/>
+              <a:t>Temperature in Kelvin</a:t>
+            </a:r>
+          </a:p>
+          <a:p>
+            <a:pPr>
+              <a:lnSpc>
+                <a:spcPct val="250000"/>
+              </a:lnSpc>
+            </a:pPr>
+            <a:r>
+              <a:rPr lang="en-US" sz="2000" dirty="0"/>
+              <a:t>Missing dates</a:t>
+            </a:r>
+          </a:p>
+          <a:p>
+            <a:pPr>
+              <a:lnSpc>
+                <a:spcPct val="250000"/>
+              </a:lnSpc>
+            </a:pPr>
+            <a:r>
+              <a:rPr lang="en-US" sz="2000" dirty="0"/>
+              <a:t>pd.to_datetime function</a:t>
+            </a:r>
+          </a:p>
+          <a:p>
+            <a:pPr>
+              <a:lnSpc>
+                <a:spcPct val="250000"/>
+              </a:lnSpc>
+            </a:pPr>
+            <a:r>
+              <a:rPr lang="en-US" sz="2000" dirty="0"/>
+              <a:t>dt.date function</a:t>
+            </a:r>
+          </a:p>
+          <a:p>
+            <a:pPr>
+              <a:lnSpc>
+                <a:spcPct val="250000"/>
+              </a:lnSpc>
+            </a:pPr>
+            <a:r>
+              <a:rPr lang="en-US" sz="2000" dirty="0"/>
+              <a:t>pyt.k2f function</a:t>
+            </a:r>
+          </a:p>
+          <a:p>
+            <a:pPr>
+              <a:lnSpc>
+                <a:spcPct val="250000"/>
+              </a:lnSpc>
+            </a:pPr>
+            <a:r>
+              <a:rPr lang="en-US" sz="2000" dirty="0"/>
+              <a:t>dropna after merging</a:t>
+            </a:r>
+          </a:p>
+          <a:p>
+            <a:pPr>
+              <a:lnSpc>
+                <a:spcPct val="250000"/>
+              </a:lnSpc>
+              <a:spcBef>
+                <a:spcPts val="1900"/>
+              </a:spcBef>
+            </a:pPr>
+            <a:r>
+              <a:rPr lang="en-US" sz="1800" dirty="0"/>
+              <a:t>1349096400 to 2012-10-01 13:00:00</a:t>
+            </a:r>
+          </a:p>
+          <a:p>
+            <a:pPr>
+              <a:lnSpc>
+                <a:spcPct val="250000"/>
+              </a:lnSpc>
+              <a:spcBef>
+                <a:spcPts val="1900"/>
+              </a:spcBef>
+            </a:pPr>
+            <a:r>
+              <a:rPr lang="en-US" sz="1800" dirty="0"/>
+              <a:t>Take only y/m/d then .mean</a:t>
+            </a:r>
+          </a:p>
+          <a:p>
+            <a:pPr>
+              <a:lnSpc>
+                <a:spcPct val="250000"/>
+              </a:lnSpc>
+              <a:spcBef>
+                <a:spcPts val="1900"/>
+              </a:spcBef>
+            </a:pPr>
+            <a:r>
+              <a:rPr lang="en-US" sz="1800" dirty="0"/>
+              <a:t>287.59 K to  57.97 F</a:t>
+            </a:r>
+          </a:p>
+          <a:p>
+            <a:pPr>
+              <a:lnSpc>
+                <a:spcPct val="250000"/>
+              </a:lnSpc>
+              <a:spcBef>
+                <a:spcPts val="1900"/>
+              </a:spcBef>
+            </a:pPr>
+            <a:r>
+              <a:rPr lang="en-US" sz="1800" dirty="0"/>
+              <a:t>Avoid skewed data</a:t>
+            </a:r>
+          </a:p>
+        </p:txBody>
+      </p:sp>
+      <p:cxnSp>
+        <p:nvCxnSpPr>
+          <p:cNvPr id="11" name="Straight Arrow Connector 10">
+            <a:extLst>
+              <a:ext uri="{FF2B5EF4-FFF2-40B4-BE49-F238E27FC236}">
+                <a16:creationId xmlns:a16="http://schemas.microsoft.com/office/drawing/2014/main" id="{5758008C-CC42-40A2-997D-94D7BA669EB2}"/>
+              </a:ext>
+            </a:extLst>
+          </p:cNvPr>
+          <p:cNvCxnSpPr/>
+          <p:nvPr/>
+        </p:nvCxnSpPr>
+        <p:spPr>
+          <a:xfrm>
+            <a:off x="2695074" y="2614863"/>
+            <a:ext cx="1475873" cy="0"/>
+          </a:xfrm>
+          <a:prstGeom prst="straightConnector1">
+            <a:avLst/>
+          </a:prstGeom>
+          <a:ln>
+            <a:tailEnd type="triangle"/>
+          </a:ln>
+        </p:spPr>
+        <p:style>
+          <a:lnRef idx="1">
+            <a:schemeClr val="accent1"/>
+          </a:lnRef>
+          <a:fillRef idx="0">
+            <a:schemeClr val="accent1"/>
+          </a:fillRef>
+          <a:effectRef idx="0">
+            <a:schemeClr val="accent1"/>
+          </a:effectRef>
+          <a:fontRef idx="minor">
+            <a:schemeClr val="tx1"/>
+          </a:fontRef>
+        </p:style>
+      </p:cxnSp>
+      <p:cxnSp>
+        <p:nvCxnSpPr>
+          <p:cNvPr id="13" name="Straight Arrow Connector 12">
+            <a:extLst>
+              <a:ext uri="{FF2B5EF4-FFF2-40B4-BE49-F238E27FC236}">
+                <a16:creationId xmlns:a16="http://schemas.microsoft.com/office/drawing/2014/main" id="{A125C3D3-5280-4A39-ABDD-EE7A0DB9FC81}"/>
+              </a:ext>
+            </a:extLst>
+          </p:cNvPr>
+          <p:cNvCxnSpPr/>
+          <p:nvPr/>
+        </p:nvCxnSpPr>
+        <p:spPr>
+          <a:xfrm>
+            <a:off x="3080084" y="3429000"/>
+            <a:ext cx="1219200" cy="0"/>
+          </a:xfrm>
+          <a:prstGeom prst="straightConnector1">
+            <a:avLst/>
+          </a:prstGeom>
+          <a:ln>
+            <a:tailEnd type="triangle"/>
+          </a:ln>
+        </p:spPr>
+        <p:style>
+          <a:lnRef idx="1">
+            <a:schemeClr val="accent1"/>
+          </a:lnRef>
+          <a:fillRef idx="0">
+            <a:schemeClr val="accent1"/>
+          </a:fillRef>
+          <a:effectRef idx="0">
+            <a:schemeClr val="accent1"/>
+          </a:effectRef>
+          <a:fontRef idx="minor">
+            <a:schemeClr val="tx1"/>
+          </a:fontRef>
+        </p:style>
+      </p:cxnSp>
+      <p:cxnSp>
+        <p:nvCxnSpPr>
+          <p:cNvPr id="15" name="Straight Arrow Connector 14">
+            <a:extLst>
+              <a:ext uri="{FF2B5EF4-FFF2-40B4-BE49-F238E27FC236}">
+                <a16:creationId xmlns:a16="http://schemas.microsoft.com/office/drawing/2014/main" id="{11DB2720-BB7A-4490-9D25-AA46388B5192}"/>
+              </a:ext>
+            </a:extLst>
+          </p:cNvPr>
+          <p:cNvCxnSpPr/>
+          <p:nvPr/>
+        </p:nvCxnSpPr>
+        <p:spPr>
+          <a:xfrm>
+            <a:off x="3384884" y="4395537"/>
+            <a:ext cx="786063" cy="0"/>
+          </a:xfrm>
+          <a:prstGeom prst="straightConnector1">
+            <a:avLst/>
+          </a:prstGeom>
+          <a:ln>
+            <a:tailEnd type="triangle"/>
+          </a:ln>
+        </p:spPr>
+        <p:style>
+          <a:lnRef idx="1">
+            <a:schemeClr val="accent1"/>
+          </a:lnRef>
+          <a:fillRef idx="0">
+            <a:schemeClr val="accent1"/>
+          </a:fillRef>
+          <a:effectRef idx="0">
+            <a:schemeClr val="accent1"/>
+          </a:effectRef>
+          <a:fontRef idx="minor">
+            <a:schemeClr val="tx1"/>
+          </a:fontRef>
+        </p:style>
+      </p:cxnSp>
+      <p:cxnSp>
+        <p:nvCxnSpPr>
+          <p:cNvPr id="17" name="Straight Arrow Connector 16">
+            <a:extLst>
+              <a:ext uri="{FF2B5EF4-FFF2-40B4-BE49-F238E27FC236}">
+                <a16:creationId xmlns:a16="http://schemas.microsoft.com/office/drawing/2014/main" id="{BC6CE767-A027-4D0E-9D39-F8F7296A6FA4}"/>
+              </a:ext>
+            </a:extLst>
+          </p:cNvPr>
+          <p:cNvCxnSpPr/>
+          <p:nvPr/>
+        </p:nvCxnSpPr>
+        <p:spPr>
+          <a:xfrm>
+            <a:off x="2695074" y="5309937"/>
+            <a:ext cx="1475873" cy="0"/>
+          </a:xfrm>
+          <a:prstGeom prst="straightConnector1">
+            <a:avLst/>
+          </a:prstGeom>
+          <a:ln>
+            <a:tailEnd type="triangle"/>
+          </a:ln>
+        </p:spPr>
+        <p:style>
+          <a:lnRef idx="1">
+            <a:schemeClr val="accent1"/>
+          </a:lnRef>
+          <a:fillRef idx="0">
+            <a:schemeClr val="accent1"/>
+          </a:fillRef>
+          <a:effectRef idx="0">
+            <a:schemeClr val="accent1"/>
+          </a:effectRef>
+          <a:fontRef idx="minor">
+            <a:schemeClr val="tx1"/>
+          </a:fontRef>
+        </p:style>
+      </p:cxnSp>
+      <p:cxnSp>
+        <p:nvCxnSpPr>
+          <p:cNvPr id="19" name="Straight Arrow Connector 18">
+            <a:extLst>
+              <a:ext uri="{FF2B5EF4-FFF2-40B4-BE49-F238E27FC236}">
+                <a16:creationId xmlns:a16="http://schemas.microsoft.com/office/drawing/2014/main" id="{B32EB21B-543F-4765-A2FE-69B2A2DF16D1}"/>
+              </a:ext>
+            </a:extLst>
+          </p:cNvPr>
+          <p:cNvCxnSpPr/>
+          <p:nvPr/>
+        </p:nvCxnSpPr>
+        <p:spPr>
+          <a:xfrm>
+            <a:off x="7042484" y="2614863"/>
+            <a:ext cx="609600" cy="0"/>
+          </a:xfrm>
+          <a:prstGeom prst="straightConnector1">
+            <a:avLst/>
+          </a:prstGeom>
+          <a:ln>
+            <a:tailEnd type="triangle"/>
+          </a:ln>
+        </p:spPr>
+        <p:style>
+          <a:lnRef idx="1">
+            <a:schemeClr val="accent1"/>
+          </a:lnRef>
+          <a:fillRef idx="0">
+            <a:schemeClr val="accent1"/>
+          </a:fillRef>
+          <a:effectRef idx="0">
+            <a:schemeClr val="accent1"/>
+          </a:effectRef>
+          <a:fontRef idx="minor">
+            <a:schemeClr val="tx1"/>
+          </a:fontRef>
+        </p:style>
+      </p:cxnSp>
+      <p:cxnSp>
+        <p:nvCxnSpPr>
+          <p:cNvPr id="21" name="Straight Arrow Connector 20">
+            <a:extLst>
+              <a:ext uri="{FF2B5EF4-FFF2-40B4-BE49-F238E27FC236}">
+                <a16:creationId xmlns:a16="http://schemas.microsoft.com/office/drawing/2014/main" id="{452F23B0-E9D8-46D6-A623-29D4997BD6B4}"/>
+              </a:ext>
+            </a:extLst>
+          </p:cNvPr>
+          <p:cNvCxnSpPr/>
+          <p:nvPr/>
+        </p:nvCxnSpPr>
+        <p:spPr>
+          <a:xfrm>
+            <a:off x="6224337" y="3429000"/>
+            <a:ext cx="1411705" cy="0"/>
+          </a:xfrm>
+          <a:prstGeom prst="straightConnector1">
+            <a:avLst/>
+          </a:prstGeom>
+          <a:ln>
+            <a:tailEnd type="triangle"/>
+          </a:ln>
+        </p:spPr>
+        <p:style>
+          <a:lnRef idx="1">
+            <a:schemeClr val="accent1"/>
+          </a:lnRef>
+          <a:fillRef idx="0">
+            <a:schemeClr val="accent1"/>
+          </a:fillRef>
+          <a:effectRef idx="0">
+            <a:schemeClr val="accent1"/>
+          </a:effectRef>
+          <a:fontRef idx="minor">
+            <a:schemeClr val="tx1"/>
+          </a:fontRef>
+        </p:style>
+      </p:cxnSp>
+      <p:cxnSp>
+        <p:nvCxnSpPr>
+          <p:cNvPr id="23" name="Straight Arrow Connector 22">
+            <a:extLst>
+              <a:ext uri="{FF2B5EF4-FFF2-40B4-BE49-F238E27FC236}">
+                <a16:creationId xmlns:a16="http://schemas.microsoft.com/office/drawing/2014/main" id="{981FDE0E-93B7-401E-BFE2-B50036C485DE}"/>
+              </a:ext>
+            </a:extLst>
+          </p:cNvPr>
+          <p:cNvCxnSpPr/>
+          <p:nvPr/>
+        </p:nvCxnSpPr>
+        <p:spPr>
+          <a:xfrm>
+            <a:off x="6096000" y="4395537"/>
+            <a:ext cx="1556084" cy="0"/>
+          </a:xfrm>
+          <a:prstGeom prst="straightConnector1">
+            <a:avLst/>
+          </a:prstGeom>
+          <a:ln>
+            <a:tailEnd type="triangle"/>
+          </a:ln>
+        </p:spPr>
+        <p:style>
+          <a:lnRef idx="1">
+            <a:schemeClr val="accent1"/>
+          </a:lnRef>
+          <a:fillRef idx="0">
+            <a:schemeClr val="accent1"/>
+          </a:fillRef>
+          <a:effectRef idx="0">
+            <a:schemeClr val="accent1"/>
+          </a:effectRef>
+          <a:fontRef idx="minor">
+            <a:schemeClr val="tx1"/>
+          </a:fontRef>
+        </p:style>
+      </p:cxnSp>
+      <p:cxnSp>
+        <p:nvCxnSpPr>
+          <p:cNvPr id="25" name="Straight Arrow Connector 24">
+            <a:extLst>
+              <a:ext uri="{FF2B5EF4-FFF2-40B4-BE49-F238E27FC236}">
+                <a16:creationId xmlns:a16="http://schemas.microsoft.com/office/drawing/2014/main" id="{FB9A7820-1C37-4AB3-9C69-D626D4A56831}"/>
+              </a:ext>
+            </a:extLst>
+          </p:cNvPr>
+          <p:cNvCxnSpPr/>
+          <p:nvPr/>
+        </p:nvCxnSpPr>
+        <p:spPr>
+          <a:xfrm>
+            <a:off x="6705600" y="5309937"/>
+            <a:ext cx="946484" cy="0"/>
+          </a:xfrm>
+          <a:prstGeom prst="straightConnector1">
+            <a:avLst/>
+          </a:prstGeom>
+          <a:ln>
+            <a:tailEnd type="triangle"/>
+          </a:ln>
+        </p:spPr>
+        <p:style>
+          <a:lnRef idx="1">
+            <a:schemeClr val="accent1"/>
+          </a:lnRef>
+          <a:fillRef idx="0">
+            <a:schemeClr val="accent1"/>
+          </a:fillRef>
+          <a:effectRef idx="0">
+            <a:schemeClr val="accent1"/>
+          </a:effectRef>
+          <a:fontRef idx="minor">
+            <a:schemeClr val="tx1"/>
+          </a:fontRef>
+        </p:style>
+      </p:cxnSp>
     </p:spTree>
     <p:extLst>
       <p:ext uri="{BB962C8B-B14F-4D97-AF65-F5344CB8AC3E}">
@@ -4802,6 +5561,14 @@
 <file path=ppt/slides/slide9.xml><?xml version="1.0" encoding="utf-8"?>
 <p:sld xmlns:a="http://schemas.openxmlformats.org/drawingml/2006/main" xmlns:r="http://schemas.openxmlformats.org/officeDocument/2006/relationships" xmlns:p="http://schemas.openxmlformats.org/presentationml/2006/main">
   <p:cSld>
+    <p:bg>
+      <p:bgPr>
+        <a:solidFill>
+          <a:schemeClr val="bg1"/>
+        </a:solidFill>
+        <a:effectLst/>
+      </p:bgPr>
+    </p:bg>
     <p:spTree>
       <p:nvGrpSpPr>
         <p:cNvPr id="1" name=""/>
@@ -4818,10 +5585,10 @@
       </p:grpSpPr>
       <p:sp>
         <p:nvSpPr>
-          <p:cNvPr id="5" name="Title 4">
-            <a:extLst>
-              <a:ext uri="{FF2B5EF4-FFF2-40B4-BE49-F238E27FC236}">
-                <a16:creationId xmlns:a16="http://schemas.microsoft.com/office/drawing/2014/main" id="{59B8E2D4-05F5-442D-A308-9BFFCA665FEA}"/>
+          <p:cNvPr id="2" name="Title 1">
+            <a:extLst>
+              <a:ext uri="{FF2B5EF4-FFF2-40B4-BE49-F238E27FC236}">
+                <a16:creationId xmlns:a16="http://schemas.microsoft.com/office/drawing/2014/main" id="{E2CC25A0-0C14-4445-BD5B-6CDFB4E3C066}"/>
               </a:ext>
             </a:extLst>
           </p:cNvPr>
@@ -4832,33 +5599,93 @@
             <p:ph type="title"/>
           </p:nvPr>
         </p:nvSpPr>
-        <p:spPr/>
-        <p:txBody>
-          <a:bodyPr/>
-          <a:lstStyle/>
-          <a:p>
-            <a:r>
-              <a:rPr lang="en-US" dirty="0"/>
-              <a:t>Weather &amp; Crime: Pearson Correlation</a:t>
-            </a:r>
-          </a:p>
-        </p:txBody>
-      </p:sp>
+        <p:spPr>
+          <a:xfrm>
+            <a:off x="960100" y="978102"/>
+            <a:ext cx="10588434" cy="1062644"/>
+          </a:xfrm>
+        </p:spPr>
+        <p:txBody>
+          <a:bodyPr vert="horz" lIns="91440" tIns="45720" rIns="91440" bIns="45720" rtlCol="0" anchor="b">
+            <a:normAutofit/>
+          </a:bodyPr>
+          <a:lstStyle/>
+          <a:p>
+            <a:r>
+              <a:rPr lang="en-US" sz="4400"/>
+              <a:t>Statistical Analysis: Pearson Correlation</a:t>
+            </a:r>
+          </a:p>
+        </p:txBody>
+      </p:sp>
+      <p:cxnSp>
+        <p:nvCxnSpPr>
+          <p:cNvPr id="135" name="Straight Connector 134">
+            <a:extLst>
+              <a:ext uri="{FF2B5EF4-FFF2-40B4-BE49-F238E27FC236}">
+                <a16:creationId xmlns:a16="http://schemas.microsoft.com/office/drawing/2014/main" id="{39B7FDC9-F0CE-43A7-9F2A-83DD09DC3453}"/>
+              </a:ext>
+              <a:ext uri="{C183D7F6-B498-43B3-948B-1728B52AA6E4}">
+                <adec:decorative xmlns:adec="http://schemas.microsoft.com/office/drawing/2017/decorative" val="1"/>
+              </a:ext>
+            </a:extLst>
+          </p:cNvPr>
+          <p:cNvCxnSpPr>
+            <a:cxnSpLocks noGrp="1" noRot="1" noChangeAspect="1" noMove="1" noResize="1" noEditPoints="1" noAdjustHandles="1" noChangeArrowheads="1" noChangeShapeType="1"/>
+          </p:cNvCxnSpPr>
+          <p:nvPr>
+            <p:extLst>
+              <p:ext uri="{386F3935-93C4-4BCD-93E2-E3B085C9AB24}">
+                <p16:designElem xmlns:p16="http://schemas.microsoft.com/office/powerpoint/2015/main" val="1"/>
+              </p:ext>
+            </p:extLst>
+          </p:nvPr>
+        </p:nvCxnSpPr>
+        <p:spPr>
+          <a:xfrm>
+            <a:off x="1047624" y="2265037"/>
+            <a:ext cx="10125012" cy="0"/>
+          </a:xfrm>
+          <a:prstGeom prst="line">
+            <a:avLst/>
+          </a:prstGeom>
+          <a:ln w="15875">
+            <a:solidFill>
+              <a:schemeClr val="tx1">
+                <a:lumMod val="65000"/>
+                <a:lumOff val="35000"/>
+              </a:schemeClr>
+            </a:solidFill>
+          </a:ln>
+        </p:spPr>
+        <p:style>
+          <a:lnRef idx="1">
+            <a:schemeClr val="accent1"/>
+          </a:lnRef>
+          <a:fillRef idx="0">
+            <a:schemeClr val="accent1"/>
+          </a:fillRef>
+          <a:effectRef idx="0">
+            <a:schemeClr val="accent1"/>
+          </a:effectRef>
+          <a:fontRef idx="minor">
+            <a:schemeClr val="tx1"/>
+          </a:fontRef>
+        </p:style>
+      </p:cxnSp>
       <p:pic>
         <p:nvPicPr>
-          <p:cNvPr id="10" name="Content Placeholder 9" descr="A screenshot of a cell phone&#10;&#10;Description automatically generated">
-            <a:extLst>
-              <a:ext uri="{FF2B5EF4-FFF2-40B4-BE49-F238E27FC236}">
-                <a16:creationId xmlns:a16="http://schemas.microsoft.com/office/drawing/2014/main" id="{28EBD97C-D6EE-4D1A-B609-010BAF7B0271}"/>
+          <p:cNvPr id="2050" name="Picture 2" descr="Correlation">
+            <a:extLst>
+              <a:ext uri="{FF2B5EF4-FFF2-40B4-BE49-F238E27FC236}">
+                <a16:creationId xmlns:a16="http://schemas.microsoft.com/office/drawing/2014/main" id="{929CC62D-025D-4821-B5A3-976EC7E6FFC5}"/>
               </a:ext>
             </a:extLst>
           </p:cNvPr>
           <p:cNvPicPr>
-            <a:picLocks noGrp="1" noChangeAspect="1"/>
+            <a:picLocks noChangeAspect="1" noChangeArrowheads="1"/>
           </p:cNvPicPr>
-          <p:nvPr>
-            <p:ph idx="1"/>
-          </p:nvPr>
+          <p:nvPr/>
         </p:nvPicPr>
         <p:blipFill>
           <a:blip r:embed="rId2">
@@ -4874,8 +5701,8 @@
         </p:blipFill>
         <p:spPr bwMode="auto">
           <a:xfrm>
-            <a:off x="1814214" y="4010827"/>
-            <a:ext cx="3950208" cy="2504318"/>
+            <a:off x="1114023" y="3483454"/>
+            <a:ext cx="3366480" cy="1355008"/>
           </a:xfrm>
           <a:prstGeom prst="rect">
             <a:avLst/>
@@ -4892,118 +5719,73 @@
           </a:extLst>
         </p:spPr>
       </p:pic>
-      <p:pic>
-        <p:nvPicPr>
-          <p:cNvPr id="12" name="Picture 11" descr="A screenshot of a cell phone&#10;&#10;Description automatically generated">
-            <a:extLst>
-              <a:ext uri="{FF2B5EF4-FFF2-40B4-BE49-F238E27FC236}">
-                <a16:creationId xmlns:a16="http://schemas.microsoft.com/office/drawing/2014/main" id="{21FD03E5-5087-4D94-A9CB-5C6613863959}"/>
-              </a:ext>
-            </a:extLst>
-          </p:cNvPr>
-          <p:cNvPicPr>
-            <a:picLocks noChangeAspect="1"/>
-          </p:cNvPicPr>
-          <p:nvPr/>
-        </p:nvPicPr>
-        <p:blipFill>
-          <a:blip r:embed="rId3">
-            <a:extLst>
-              <a:ext uri="{28A0092B-C50C-407E-A947-70E740481C1C}">
-                <a14:useLocalDpi xmlns:a14="http://schemas.microsoft.com/office/drawing/2010/main" val="0"/>
-              </a:ext>
-            </a:extLst>
-          </a:blip>
-          <a:stretch>
-            <a:fillRect/>
-          </a:stretch>
-        </p:blipFill>
+      <p:sp>
+        <p:nvSpPr>
+          <p:cNvPr id="4" name="Text Placeholder 3">
+            <a:extLst>
+              <a:ext uri="{FF2B5EF4-FFF2-40B4-BE49-F238E27FC236}">
+                <a16:creationId xmlns:a16="http://schemas.microsoft.com/office/drawing/2014/main" id="{03F646AD-70CA-4FC9-A261-F9883EF7EE82}"/>
+              </a:ext>
+            </a:extLst>
+          </p:cNvPr>
+          <p:cNvSpPr>
+            <a:spLocks noGrp="1"/>
+          </p:cNvSpPr>
+          <p:nvPr>
+            <p:ph type="body" sz="half" idx="2"/>
+          </p:nvPr>
+        </p:nvSpPr>
         <p:spPr>
           <a:xfrm>
-            <a:off x="1785932" y="1396339"/>
-            <a:ext cx="3948717" cy="2546010"/>
-          </a:xfrm>
-          <a:prstGeom prst="rect">
-            <a:avLst/>
-          </a:prstGeom>
-        </p:spPr>
-      </p:pic>
-      <p:pic>
-        <p:nvPicPr>
-          <p:cNvPr id="14" name="Picture 13" descr="A screenshot of a cell phone&#10;&#10;Description automatically generated">
-            <a:extLst>
-              <a:ext uri="{FF2B5EF4-FFF2-40B4-BE49-F238E27FC236}">
-                <a16:creationId xmlns:a16="http://schemas.microsoft.com/office/drawing/2014/main" id="{4BD472A3-F767-4955-BDD6-D03F31412E6D}"/>
-              </a:ext>
-            </a:extLst>
-          </p:cNvPr>
-          <p:cNvPicPr>
-            <a:picLocks noChangeAspect="1"/>
-          </p:cNvPicPr>
-          <p:nvPr/>
-        </p:nvPicPr>
-        <p:blipFill>
-          <a:blip r:embed="rId4">
-            <a:extLst>
-              <a:ext uri="{28A0092B-C50C-407E-A947-70E740481C1C}">
-                <a14:useLocalDpi xmlns:a14="http://schemas.microsoft.com/office/drawing/2010/main" val="0"/>
-              </a:ext>
-            </a:extLst>
-          </a:blip>
-          <a:stretch>
-            <a:fillRect/>
-          </a:stretch>
-        </p:blipFill>
-        <p:spPr>
-          <a:xfrm>
-            <a:off x="6427579" y="3989500"/>
-            <a:ext cx="3950208" cy="2546972"/>
-          </a:xfrm>
-          <a:prstGeom prst="rect">
-            <a:avLst/>
-          </a:prstGeom>
-        </p:spPr>
-      </p:pic>
-      <p:pic>
-        <p:nvPicPr>
-          <p:cNvPr id="16" name="Picture 15" descr="A screenshot of a cell phone&#10;&#10;Description automatically generated">
-            <a:extLst>
-              <a:ext uri="{FF2B5EF4-FFF2-40B4-BE49-F238E27FC236}">
-                <a16:creationId xmlns:a16="http://schemas.microsoft.com/office/drawing/2014/main" id="{AFE2AD58-15EF-4F34-A700-692BED185970}"/>
-              </a:ext>
-            </a:extLst>
-          </p:cNvPr>
-          <p:cNvPicPr>
-            <a:picLocks noChangeAspect="1"/>
-          </p:cNvPicPr>
-          <p:nvPr/>
-        </p:nvPicPr>
-        <p:blipFill>
-          <a:blip r:embed="rId5">
-            <a:extLst>
-              <a:ext uri="{28A0092B-C50C-407E-A947-70E740481C1C}">
-                <a14:useLocalDpi xmlns:a14="http://schemas.microsoft.com/office/drawing/2010/main" val="0"/>
-              </a:ext>
-            </a:extLst>
-          </a:blip>
-          <a:stretch>
-            <a:fillRect/>
-          </a:stretch>
-        </p:blipFill>
-        <p:spPr>
-          <a:xfrm>
-            <a:off x="6457353" y="1396339"/>
-            <a:ext cx="3950208" cy="2546972"/>
-          </a:xfrm>
-          <a:prstGeom prst="rect">
-            <a:avLst/>
-          </a:prstGeom>
-        </p:spPr>
-      </p:pic>
+            <a:off x="4955354" y="3354785"/>
+            <a:ext cx="6282169" cy="3215749"/>
+          </a:xfrm>
+        </p:spPr>
+        <p:txBody>
+          <a:bodyPr vert="horz" lIns="91440" tIns="45720" rIns="91440" bIns="45720" rtlCol="0">
+            <a:normAutofit/>
+          </a:bodyPr>
+          <a:lstStyle/>
+          <a:p>
+            <a:pPr indent="-228600">
+              <a:buFont typeface="Arial" panose="020B0604020202020204" pitchFamily="34" charset="0"/>
+              <a:buChar char="•"/>
+            </a:pPr>
+            <a:r>
+              <a:rPr lang="en-US" sz="2400" b="1" dirty="0"/>
+              <a:t>correlation coefficient</a:t>
+            </a:r>
+            <a:r>
+              <a:rPr lang="en-US" sz="2400" dirty="0"/>
+              <a:t> is a measure of the strength of the linear relationship between two variables.</a:t>
+            </a:r>
+          </a:p>
+          <a:p>
+            <a:pPr marL="285750" indent="-228600">
+              <a:buFont typeface="Arial" panose="020B0604020202020204" pitchFamily="34" charset="0"/>
+              <a:buChar char="•"/>
+            </a:pPr>
+            <a:r>
+              <a:rPr lang="en-US" sz="2400" dirty="0"/>
+              <a:t>A perfect positive linear relationship, r = 1.</a:t>
+            </a:r>
+          </a:p>
+          <a:p>
+            <a:pPr marL="285750" indent="-228600">
+              <a:buFont typeface="Arial" panose="020B0604020202020204" pitchFamily="34" charset="0"/>
+              <a:buChar char="•"/>
+            </a:pPr>
+            <a:r>
+              <a:rPr lang="en-US" sz="2400" dirty="0"/>
+              <a:t>A perfect negative linear relationship, r = -1.</a:t>
+            </a:r>
+          </a:p>
+        </p:txBody>
+      </p:sp>
     </p:spTree>
     <p:extLst>
       <p:ext uri="{BB962C8B-B14F-4D97-AF65-F5344CB8AC3E}">
-        <p14:creationId xmlns:p14="http://schemas.microsoft.com/office/powerpoint/2010/main" val="918526572"/>
+        <p14:creationId xmlns:p14="http://schemas.microsoft.com/office/powerpoint/2010/main" val="921853661"/>
       </p:ext>
     </p:extLst>
   </p:cSld>

</xml_diff>

<commit_message>
showed battery v weather pearson chart
</commit_message>
<xml_diff>
--- a/Weather_vs_Crime.pptx
+++ b/Weather_vs_Crime.pptx
@@ -5615,13 +5615,13 @@
         </p:spPr>
         <p:txBody>
           <a:bodyPr vert="horz" lIns="91440" tIns="45720" rIns="91440" bIns="45720" rtlCol="0" anchor="b">
-            <a:normAutofit/>
+            <a:normAutofit fontScale="90000"/>
           </a:bodyPr>
           <a:lstStyle/>
           <a:p>
             <a:r>
-              <a:rPr lang="en-US" sz="4400"/>
-              <a:t>Statistical Analysis: Pearson Correlation</a:t>
+              <a:rPr lang="en-US" sz="4400" dirty="0"/>
+              <a:t>Statistical Analysis: Pearson Correlation Coefficient</a:t>
             </a:r>
           </a:p>
         </p:txBody>

</xml_diff>

<commit_message>
added mansi's slides to master ppt
</commit_message>
<xml_diff>
--- a/Weather_vs_Crime.pptx
+++ b/Weather_vs_Crime.pptx
@@ -14,8 +14,12 @@
     <p:sldId id="261" r:id="rId8"/>
     <p:sldId id="263" r:id="rId9"/>
     <p:sldId id="268" r:id="rId10"/>
-    <p:sldId id="266" r:id="rId11"/>
-    <p:sldId id="264" r:id="rId12"/>
+    <p:sldId id="269" r:id="rId11"/>
+    <p:sldId id="270" r:id="rId12"/>
+    <p:sldId id="271" r:id="rId13"/>
+    <p:sldId id="266" r:id="rId14"/>
+    <p:sldId id="264" r:id="rId15"/>
+    <p:sldId id="272" r:id="rId16"/>
   </p:sldIdLst>
   <p:sldSz cx="12192000" cy="6858000"/>
   <p:notesSz cx="6858000" cy="9144000"/>
@@ -3667,6 +3671,981 @@
       </p:grpSpPr>
       <p:sp>
         <p:nvSpPr>
+          <p:cNvPr id="11" name="Rectangle 10">
+            <a:extLst>
+              <a:ext uri="{FF2B5EF4-FFF2-40B4-BE49-F238E27FC236}">
+                <a16:creationId xmlns:a16="http://schemas.microsoft.com/office/drawing/2014/main" id="{867D4867-5BA7-4462-B2F6-A23F4A622AA7}"/>
+              </a:ext>
+              <a:ext uri="{C183D7F6-B498-43B3-948B-1728B52AA6E4}">
+                <adec:decorative xmlns:adec="http://schemas.microsoft.com/office/drawing/2017/decorative" val="1"/>
+              </a:ext>
+            </a:extLst>
+          </p:cNvPr>
+          <p:cNvSpPr>
+            <a:spLocks noGrp="1" noRot="1" noChangeAspect="1" noMove="1" noResize="1" noEditPoints="1" noAdjustHandles="1" noChangeArrowheads="1" noChangeShapeType="1" noTextEdit="1"/>
+          </p:cNvSpPr>
+          <p:nvPr>
+            <p:extLst>
+              <p:ext uri="{386F3935-93C4-4BCD-93E2-E3B085C9AB24}">
+                <p16:designElem xmlns:p16="http://schemas.microsoft.com/office/powerpoint/2015/main" val="1"/>
+              </p:ext>
+            </p:extLst>
+          </p:nvPr>
+        </p:nvSpPr>
+        <p:spPr>
+          <a:xfrm>
+            <a:off x="0" y="0"/>
+            <a:ext cx="4654296" cy="6858000"/>
+          </a:xfrm>
+          <a:prstGeom prst="rect">
+            <a:avLst/>
+          </a:prstGeom>
+          <a:solidFill>
+            <a:schemeClr val="tx1">
+              <a:lumMod val="75000"/>
+              <a:lumOff val="25000"/>
+            </a:schemeClr>
+          </a:solidFill>
+          <a:ln>
+            <a:noFill/>
+          </a:ln>
+        </p:spPr>
+        <p:style>
+          <a:lnRef idx="0">
+            <a:scrgbClr r="0" g="0" b="0"/>
+          </a:lnRef>
+          <a:fillRef idx="0">
+            <a:scrgbClr r="0" g="0" b="0"/>
+          </a:fillRef>
+          <a:effectRef idx="0">
+            <a:scrgbClr r="0" g="0" b="0"/>
+          </a:effectRef>
+          <a:fontRef idx="minor">
+            <a:schemeClr val="lt1"/>
+          </a:fontRef>
+        </p:style>
+        <p:txBody>
+          <a:bodyPr rtlCol="0" anchor="ctr"/>
+          <a:lstStyle/>
+          <a:p>
+            <a:pPr algn="ctr"/>
+            <a:endParaRPr lang="en-US"/>
+          </a:p>
+        </p:txBody>
+      </p:sp>
+      <p:sp>
+        <p:nvSpPr>
+          <p:cNvPr id="2" name="Title 1">
+            <a:extLst>
+              <a:ext uri="{FF2B5EF4-FFF2-40B4-BE49-F238E27FC236}">
+                <a16:creationId xmlns:a16="http://schemas.microsoft.com/office/drawing/2014/main" id="{6493471A-CE75-C840-9FBD-AD80FA9014C7}"/>
+              </a:ext>
+            </a:extLst>
+          </p:cNvPr>
+          <p:cNvSpPr>
+            <a:spLocks noGrp="1"/>
+          </p:cNvSpPr>
+          <p:nvPr>
+            <p:ph type="title"/>
+          </p:nvPr>
+        </p:nvSpPr>
+        <p:spPr>
+          <a:xfrm>
+            <a:off x="643467" y="643467"/>
+            <a:ext cx="3363974" cy="1597315"/>
+          </a:xfrm>
+          <a:noFill/>
+          <a:ln w="19050">
+            <a:solidFill>
+              <a:schemeClr val="bg1"/>
+            </a:solidFill>
+          </a:ln>
+        </p:spPr>
+        <p:txBody>
+          <a:bodyPr vert="horz" wrap="square" lIns="91440" tIns="45720" rIns="91440" bIns="45720" rtlCol="0" anchor="ctr">
+            <a:normAutofit/>
+          </a:bodyPr>
+          <a:lstStyle/>
+          <a:p>
+            <a:pPr algn="ctr"/>
+            <a:r>
+              <a:rPr lang="en-US" sz="2800" kern="1200">
+                <a:solidFill>
+                  <a:schemeClr val="bg1"/>
+                </a:solidFill>
+                <a:latin typeface="+mj-lt"/>
+                <a:ea typeface="+mj-ea"/>
+                <a:cs typeface="+mj-cs"/>
+              </a:rPr>
+              <a:t>The Data: Analysis Process</a:t>
+            </a:r>
+          </a:p>
+        </p:txBody>
+      </p:sp>
+      <p:sp>
+        <p:nvSpPr>
+          <p:cNvPr id="4" name="Text Placeholder 3">
+            <a:extLst>
+              <a:ext uri="{FF2B5EF4-FFF2-40B4-BE49-F238E27FC236}">
+                <a16:creationId xmlns:a16="http://schemas.microsoft.com/office/drawing/2014/main" id="{98750AB1-569F-934C-8635-E7A4B21E49F6}"/>
+              </a:ext>
+            </a:extLst>
+          </p:cNvPr>
+          <p:cNvSpPr>
+            <a:spLocks noGrp="1"/>
+          </p:cNvSpPr>
+          <p:nvPr>
+            <p:ph type="body" sz="half" idx="2"/>
+          </p:nvPr>
+        </p:nvSpPr>
+        <p:spPr>
+          <a:xfrm>
+            <a:off x="643468" y="2638044"/>
+            <a:ext cx="3363974" cy="3415622"/>
+          </a:xfrm>
+        </p:spPr>
+        <p:txBody>
+          <a:bodyPr vert="horz" lIns="91440" tIns="45720" rIns="91440" bIns="45720" rtlCol="0">
+            <a:normAutofit/>
+          </a:bodyPr>
+          <a:lstStyle/>
+          <a:p>
+            <a:pPr indent="-228600">
+              <a:buFont typeface="Arial" panose="020B0604020202020204" pitchFamily="34" charset="0"/>
+              <a:buChar char="•"/>
+            </a:pPr>
+            <a:endParaRPr lang="en-US" sz="2000">
+              <a:solidFill>
+                <a:schemeClr val="bg1"/>
+              </a:solidFill>
+            </a:endParaRPr>
+          </a:p>
+          <a:p>
+            <a:pPr indent="-228600">
+              <a:buFont typeface="Arial" panose="020B0604020202020204" pitchFamily="34" charset="0"/>
+              <a:buChar char="•"/>
+            </a:pPr>
+            <a:endParaRPr lang="en-US" sz="2000">
+              <a:solidFill>
+                <a:schemeClr val="bg1"/>
+              </a:solidFill>
+            </a:endParaRPr>
+          </a:p>
+          <a:p>
+            <a:pPr indent="-228600">
+              <a:buFont typeface="Arial" panose="020B0604020202020204" pitchFamily="34" charset="0"/>
+              <a:buChar char="•"/>
+            </a:pPr>
+            <a:endParaRPr lang="en-US" sz="2000">
+              <a:solidFill>
+                <a:schemeClr val="bg1"/>
+              </a:solidFill>
+            </a:endParaRPr>
+          </a:p>
+          <a:p>
+            <a:pPr indent="-228600">
+              <a:buFont typeface="Arial" panose="020B0604020202020204" pitchFamily="34" charset="0"/>
+              <a:buChar char="•"/>
+            </a:pPr>
+            <a:r>
+              <a:rPr lang="en-US" sz="2000">
+                <a:solidFill>
+                  <a:schemeClr val="bg1"/>
+                </a:solidFill>
+              </a:rPr>
+              <a:t>Let us first look at trend in temperature in the past 5 years. </a:t>
+            </a:r>
+          </a:p>
+          <a:p>
+            <a:pPr indent="-228600">
+              <a:buFont typeface="Arial" panose="020B0604020202020204" pitchFamily="34" charset="0"/>
+              <a:buChar char="•"/>
+            </a:pPr>
+            <a:r>
+              <a:rPr lang="en-US" sz="2000">
+                <a:solidFill>
+                  <a:schemeClr val="bg1"/>
+                </a:solidFill>
+              </a:rPr>
+              <a:t>The incomplete line is due to insufficient data that wasn’t recorded from August 2014 to June 2015</a:t>
+            </a:r>
+          </a:p>
+        </p:txBody>
+      </p:sp>
+      <p:pic>
+        <p:nvPicPr>
+          <p:cNvPr id="6" name="Content Placeholder 5" descr="A close up of a map&#10;&#10;Description automatically generated">
+            <a:extLst>
+              <a:ext uri="{FF2B5EF4-FFF2-40B4-BE49-F238E27FC236}">
+                <a16:creationId xmlns:a16="http://schemas.microsoft.com/office/drawing/2014/main" id="{62DE73B5-3C17-9041-8C7D-9D0730F1C488}"/>
+              </a:ext>
+            </a:extLst>
+          </p:cNvPr>
+          <p:cNvPicPr>
+            <a:picLocks noGrp="1" noChangeAspect="1"/>
+          </p:cNvPicPr>
+          <p:nvPr>
+            <p:ph idx="1"/>
+          </p:nvPr>
+        </p:nvPicPr>
+        <p:blipFill>
+          <a:blip r:embed="rId2">
+            <a:extLst>
+              <a:ext uri="{28A0092B-C50C-407E-A947-70E740481C1C}">
+                <a14:useLocalDpi xmlns:a14="http://schemas.microsoft.com/office/drawing/2010/main" val="0"/>
+              </a:ext>
+            </a:extLst>
+          </a:blip>
+          <a:stretch>
+            <a:fillRect/>
+          </a:stretch>
+        </p:blipFill>
+        <p:spPr>
+          <a:xfrm>
+            <a:off x="5297763" y="1262372"/>
+            <a:ext cx="6250769" cy="4172388"/>
+          </a:xfrm>
+          <a:prstGeom prst="rect">
+            <a:avLst/>
+          </a:prstGeom>
+        </p:spPr>
+      </p:pic>
+    </p:spTree>
+    <p:extLst>
+      <p:ext uri="{BB962C8B-B14F-4D97-AF65-F5344CB8AC3E}">
+        <p14:creationId xmlns:p14="http://schemas.microsoft.com/office/powerpoint/2010/main" val="463449078"/>
+      </p:ext>
+    </p:extLst>
+  </p:cSld>
+  <p:clrMapOvr>
+    <a:masterClrMapping/>
+  </p:clrMapOvr>
+</p:sld>
+</file>
+
+<file path=ppt/slides/slide11.xml><?xml version="1.0" encoding="utf-8"?>
+<p:sld xmlns:a="http://schemas.openxmlformats.org/drawingml/2006/main" xmlns:r="http://schemas.openxmlformats.org/officeDocument/2006/relationships" xmlns:p="http://schemas.openxmlformats.org/presentationml/2006/main">
+  <p:cSld>
+    <p:bg>
+      <p:bgPr>
+        <a:solidFill>
+          <a:schemeClr val="bg1"/>
+        </a:solidFill>
+        <a:effectLst/>
+      </p:bgPr>
+    </p:bg>
+    <p:spTree>
+      <p:nvGrpSpPr>
+        <p:cNvPr id="1" name=""/>
+        <p:cNvGrpSpPr/>
+        <p:nvPr/>
+      </p:nvGrpSpPr>
+      <p:grpSpPr>
+        <a:xfrm>
+          <a:off x="0" y="0"/>
+          <a:ext cx="0" cy="0"/>
+          <a:chOff x="0" y="0"/>
+          <a:chExt cx="0" cy="0"/>
+        </a:xfrm>
+      </p:grpSpPr>
+      <p:sp>
+        <p:nvSpPr>
+          <p:cNvPr id="17" name="Rectangle 16">
+            <a:extLst>
+              <a:ext uri="{FF2B5EF4-FFF2-40B4-BE49-F238E27FC236}">
+                <a16:creationId xmlns:a16="http://schemas.microsoft.com/office/drawing/2014/main" id="{F0618178-4B5C-46A4-9E68-052C31FA6E9A}"/>
+              </a:ext>
+              <a:ext uri="{C183D7F6-B498-43B3-948B-1728B52AA6E4}">
+                <adec:decorative xmlns:adec="http://schemas.microsoft.com/office/drawing/2017/decorative" val="1"/>
+              </a:ext>
+            </a:extLst>
+          </p:cNvPr>
+          <p:cNvSpPr>
+            <a:spLocks noGrp="1" noRot="1" noChangeAspect="1" noMove="1" noResize="1" noEditPoints="1" noAdjustHandles="1" noChangeArrowheads="1" noChangeShapeType="1" noTextEdit="1"/>
+          </p:cNvSpPr>
+          <p:nvPr>
+            <p:extLst>
+              <p:ext uri="{386F3935-93C4-4BCD-93E2-E3B085C9AB24}">
+                <p16:designElem xmlns:p16="http://schemas.microsoft.com/office/powerpoint/2015/main" val="1"/>
+              </p:ext>
+            </p:extLst>
+          </p:nvPr>
+        </p:nvSpPr>
+        <p:spPr bwMode="ltGray">
+          <a:xfrm>
+            <a:off x="4708357" y="3509963"/>
+            <a:ext cx="7092215" cy="2967839"/>
+          </a:xfrm>
+          <a:prstGeom prst="rect">
+            <a:avLst/>
+          </a:prstGeom>
+          <a:solidFill>
+            <a:srgbClr val="404040"/>
+          </a:solidFill>
+          <a:ln w="127000" cap="sq" cmpd="thinThick">
+            <a:solidFill>
+              <a:srgbClr val="404040"/>
+            </a:solidFill>
+          </a:ln>
+        </p:spPr>
+        <p:style>
+          <a:lnRef idx="2">
+            <a:schemeClr val="accent1">
+              <a:shade val="50000"/>
+            </a:schemeClr>
+          </a:lnRef>
+          <a:fillRef idx="1">
+            <a:schemeClr val="accent1"/>
+          </a:fillRef>
+          <a:effectRef idx="0">
+            <a:schemeClr val="accent1"/>
+          </a:effectRef>
+          <a:fontRef idx="minor">
+            <a:schemeClr val="lt1"/>
+          </a:fontRef>
+        </p:style>
+        <p:txBody>
+          <a:bodyPr rtlCol="0" anchor="ctr"/>
+          <a:lstStyle/>
+          <a:p>
+            <a:pPr algn="ctr"/>
+            <a:endParaRPr lang="en-US" dirty="0"/>
+          </a:p>
+        </p:txBody>
+      </p:sp>
+      <p:sp>
+        <p:nvSpPr>
+          <p:cNvPr id="2" name="Title 1">
+            <a:extLst>
+              <a:ext uri="{FF2B5EF4-FFF2-40B4-BE49-F238E27FC236}">
+                <a16:creationId xmlns:a16="http://schemas.microsoft.com/office/drawing/2014/main" id="{CA487C24-1972-E540-AD2A-ECCBF3D59679}"/>
+              </a:ext>
+            </a:extLst>
+          </p:cNvPr>
+          <p:cNvSpPr>
+            <a:spLocks noGrp="1"/>
+          </p:cNvSpPr>
+          <p:nvPr>
+            <p:ph type="title"/>
+          </p:nvPr>
+        </p:nvSpPr>
+        <p:spPr>
+          <a:xfrm>
+            <a:off x="5021821" y="3812954"/>
+            <a:ext cx="6465287" cy="1516014"/>
+          </a:xfrm>
+        </p:spPr>
+        <p:txBody>
+          <a:bodyPr vert="horz" lIns="91440" tIns="45720" rIns="91440" bIns="45720" rtlCol="0" anchor="b">
+            <a:normAutofit/>
+          </a:bodyPr>
+          <a:lstStyle/>
+          <a:p>
+            <a:r>
+              <a:rPr lang="en-US" sz="3400">
+                <a:solidFill>
+                  <a:srgbClr val="FFFFFF"/>
+                </a:solidFill>
+              </a:rPr>
+              <a:t>Now let’s take a look at the Trend in 4 Categories of Violent Crimes in the past 5 years</a:t>
+            </a:r>
+          </a:p>
+        </p:txBody>
+      </p:sp>
+      <p:pic>
+        <p:nvPicPr>
+          <p:cNvPr id="12" name="Picture 11" descr="A close up of a map&#10;&#10;Description automatically generated">
+            <a:extLst>
+              <a:ext uri="{FF2B5EF4-FFF2-40B4-BE49-F238E27FC236}">
+                <a16:creationId xmlns:a16="http://schemas.microsoft.com/office/drawing/2014/main" id="{B90A2A23-5A7E-034C-9E0E-F30BE7AB24E1}"/>
+              </a:ext>
+            </a:extLst>
+          </p:cNvPr>
+          <p:cNvPicPr>
+            <a:picLocks noChangeAspect="1"/>
+          </p:cNvPicPr>
+          <p:nvPr/>
+        </p:nvPicPr>
+        <p:blipFill rotWithShape="1">
+          <a:blip r:embed="rId2">
+            <a:extLst>
+              <a:ext uri="{28A0092B-C50C-407E-A947-70E740481C1C}">
+                <a14:useLocalDpi xmlns:a14="http://schemas.microsoft.com/office/drawing/2010/main" val="0"/>
+              </a:ext>
+            </a:extLst>
+          </a:blip>
+          <a:srcRect l="11236" r="9427" b="-1"/>
+          <a:stretch/>
+        </p:blipFill>
+        <p:spPr>
+          <a:xfrm>
+            <a:off x="641434" y="321733"/>
+            <a:ext cx="3512853" cy="2966630"/>
+          </a:xfrm>
+          <a:prstGeom prst="rect">
+            <a:avLst/>
+          </a:prstGeom>
+        </p:spPr>
+      </p:pic>
+      <p:pic>
+        <p:nvPicPr>
+          <p:cNvPr id="10" name="Picture 9" descr="A close up of a map&#10;&#10;Description automatically generated">
+            <a:extLst>
+              <a:ext uri="{FF2B5EF4-FFF2-40B4-BE49-F238E27FC236}">
+                <a16:creationId xmlns:a16="http://schemas.microsoft.com/office/drawing/2014/main" id="{E3013887-FCEE-1B47-97C7-7B010DAB9A3E}"/>
+              </a:ext>
+            </a:extLst>
+          </p:cNvPr>
+          <p:cNvPicPr>
+            <a:picLocks noChangeAspect="1"/>
+          </p:cNvPicPr>
+          <p:nvPr/>
+        </p:nvPicPr>
+        <p:blipFill rotWithShape="1">
+          <a:blip r:embed="rId3">
+            <a:extLst>
+              <a:ext uri="{28A0092B-C50C-407E-A947-70E740481C1C}">
+                <a14:useLocalDpi xmlns:a14="http://schemas.microsoft.com/office/drawing/2010/main" val="0"/>
+              </a:ext>
+            </a:extLst>
+          </a:blip>
+          <a:srcRect l="9933" r="10042" b="4"/>
+          <a:stretch/>
+        </p:blipFill>
+        <p:spPr>
+          <a:xfrm>
+            <a:off x="4638789" y="613847"/>
+            <a:ext cx="2775313" cy="2340843"/>
+          </a:xfrm>
+          <a:prstGeom prst="rect">
+            <a:avLst/>
+          </a:prstGeom>
+        </p:spPr>
+      </p:pic>
+      <p:pic>
+        <p:nvPicPr>
+          <p:cNvPr id="6" name="Content Placeholder 5" descr="A close up of a map&#10;&#10;Description automatically generated">
+            <a:extLst>
+              <a:ext uri="{FF2B5EF4-FFF2-40B4-BE49-F238E27FC236}">
+                <a16:creationId xmlns:a16="http://schemas.microsoft.com/office/drawing/2014/main" id="{B3AFF2DE-74F3-134B-B443-9F66CFCAD5C4}"/>
+              </a:ext>
+            </a:extLst>
+          </p:cNvPr>
+          <p:cNvPicPr>
+            <a:picLocks noGrp="1" noChangeAspect="1"/>
+          </p:cNvPicPr>
+          <p:nvPr>
+            <p:ph sz="half" idx="2"/>
+          </p:nvPr>
+        </p:nvPicPr>
+        <p:blipFill rotWithShape="1">
+          <a:blip r:embed="rId4">
+            <a:extLst>
+              <a:ext uri="{28A0092B-C50C-407E-A947-70E740481C1C}">
+                <a14:useLocalDpi xmlns:a14="http://schemas.microsoft.com/office/drawing/2010/main" val="0"/>
+              </a:ext>
+            </a:extLst>
+          </a:blip>
+          <a:srcRect l="4517" r="3583" b="-1"/>
+          <a:stretch/>
+        </p:blipFill>
+        <p:spPr>
+          <a:xfrm>
+            <a:off x="7666091" y="299363"/>
+            <a:ext cx="4126115" cy="3008188"/>
+          </a:xfrm>
+          <a:prstGeom prst="rect">
+            <a:avLst/>
+          </a:prstGeom>
+        </p:spPr>
+      </p:pic>
+      <p:cxnSp>
+        <p:nvCxnSpPr>
+          <p:cNvPr id="19" name="Straight Connector 18">
+            <a:extLst>
+              <a:ext uri="{FF2B5EF4-FFF2-40B4-BE49-F238E27FC236}">
+                <a16:creationId xmlns:a16="http://schemas.microsoft.com/office/drawing/2014/main" id="{936FD40B-09C1-46D7-9E32-CC9BD7629FD2}"/>
+              </a:ext>
+              <a:ext uri="{C183D7F6-B498-43B3-948B-1728B52AA6E4}">
+                <adec:decorative xmlns:adec="http://schemas.microsoft.com/office/drawing/2017/decorative" val="1"/>
+              </a:ext>
+            </a:extLst>
+          </p:cNvPr>
+          <p:cNvCxnSpPr>
+            <a:cxnSpLocks noGrp="1" noRot="1" noChangeAspect="1" noMove="1" noResize="1" noEditPoints="1" noAdjustHandles="1" noChangeArrowheads="1" noChangeShapeType="1"/>
+          </p:cNvCxnSpPr>
+          <p:nvPr>
+            <p:extLst>
+              <p:ext uri="{386F3935-93C4-4BCD-93E2-E3B085C9AB24}">
+                <p16:designElem xmlns:p16="http://schemas.microsoft.com/office/powerpoint/2015/main" val="1"/>
+              </p:ext>
+            </p:extLst>
+          </p:nvPr>
+        </p:nvCxnSpPr>
+        <p:spPr>
+          <a:xfrm>
+            <a:off x="5138287" y="5443086"/>
+            <a:ext cx="6400800" cy="0"/>
+          </a:xfrm>
+          <a:prstGeom prst="line">
+            <a:avLst/>
+          </a:prstGeom>
+          <a:ln w="22225">
+            <a:solidFill>
+              <a:srgbClr val="D9D9D9"/>
+            </a:solidFill>
+          </a:ln>
+        </p:spPr>
+        <p:style>
+          <a:lnRef idx="1">
+            <a:schemeClr val="accent1"/>
+          </a:lnRef>
+          <a:fillRef idx="0">
+            <a:schemeClr val="accent1"/>
+          </a:fillRef>
+          <a:effectRef idx="0">
+            <a:schemeClr val="accent1"/>
+          </a:effectRef>
+          <a:fontRef idx="minor">
+            <a:schemeClr val="tx1"/>
+          </a:fontRef>
+        </p:style>
+      </p:cxnSp>
+      <p:pic>
+        <p:nvPicPr>
+          <p:cNvPr id="8" name="Content Placeholder 7" descr="A close up of a map&#10;&#10;Description automatically generated">
+            <a:extLst>
+              <a:ext uri="{FF2B5EF4-FFF2-40B4-BE49-F238E27FC236}">
+                <a16:creationId xmlns:a16="http://schemas.microsoft.com/office/drawing/2014/main" id="{E9C18C6C-C551-4048-8E1E-706174493C32}"/>
+              </a:ext>
+            </a:extLst>
+          </p:cNvPr>
+          <p:cNvPicPr>
+            <a:picLocks noGrp="1" noChangeAspect="1"/>
+          </p:cNvPicPr>
+          <p:nvPr>
+            <p:ph sz="half" idx="1"/>
+          </p:nvPr>
+        </p:nvPicPr>
+        <p:blipFill rotWithShape="1">
+          <a:blip r:embed="rId5">
+            <a:extLst>
+              <a:ext uri="{28A0092B-C50C-407E-A947-70E740481C1C}">
+                <a14:useLocalDpi xmlns:a14="http://schemas.microsoft.com/office/drawing/2010/main" val="0"/>
+              </a:ext>
+            </a:extLst>
+          </a:blip>
+          <a:srcRect l="1741" r="5475" b="-4"/>
+          <a:stretch/>
+        </p:blipFill>
+        <p:spPr>
+          <a:xfrm>
+            <a:off x="317635" y="3509433"/>
+            <a:ext cx="4160452" cy="3026833"/>
+          </a:xfrm>
+          <a:prstGeom prst="rect">
+            <a:avLst/>
+          </a:prstGeom>
+        </p:spPr>
+      </p:pic>
+    </p:spTree>
+    <p:extLst>
+      <p:ext uri="{BB962C8B-B14F-4D97-AF65-F5344CB8AC3E}">
+        <p14:creationId xmlns:p14="http://schemas.microsoft.com/office/powerpoint/2010/main" val="1401208564"/>
+      </p:ext>
+    </p:extLst>
+  </p:cSld>
+  <p:clrMapOvr>
+    <a:masterClrMapping/>
+  </p:clrMapOvr>
+</p:sld>
+</file>
+
+<file path=ppt/slides/slide12.xml><?xml version="1.0" encoding="utf-8"?>
+<p:sld xmlns:a="http://schemas.openxmlformats.org/drawingml/2006/main" xmlns:r="http://schemas.openxmlformats.org/officeDocument/2006/relationships" xmlns:p="http://schemas.openxmlformats.org/presentationml/2006/main">
+  <p:cSld>
+    <p:bg>
+      <p:bgPr>
+        <a:solidFill>
+          <a:schemeClr val="bg1"/>
+        </a:solidFill>
+        <a:effectLst/>
+      </p:bgPr>
+    </p:bg>
+    <p:spTree>
+      <p:nvGrpSpPr>
+        <p:cNvPr id="1" name=""/>
+        <p:cNvGrpSpPr/>
+        <p:nvPr/>
+      </p:nvGrpSpPr>
+      <p:grpSpPr>
+        <a:xfrm>
+          <a:off x="0" y="0"/>
+          <a:ext cx="0" cy="0"/>
+          <a:chOff x="0" y="0"/>
+          <a:chExt cx="0" cy="0"/>
+        </a:xfrm>
+      </p:grpSpPr>
+      <p:sp>
+        <p:nvSpPr>
+          <p:cNvPr id="15" name="Rectangle 14">
+            <a:extLst>
+              <a:ext uri="{FF2B5EF4-FFF2-40B4-BE49-F238E27FC236}">
+                <a16:creationId xmlns:a16="http://schemas.microsoft.com/office/drawing/2014/main" id="{928F64C6-FE22-4FC1-A763-DFCC514811BD}"/>
+              </a:ext>
+              <a:ext uri="{C183D7F6-B498-43B3-948B-1728B52AA6E4}">
+                <adec:decorative xmlns:adec="http://schemas.microsoft.com/office/drawing/2017/decorative" val="1"/>
+              </a:ext>
+            </a:extLst>
+          </p:cNvPr>
+          <p:cNvSpPr>
+            <a:spLocks noGrp="1" noRot="1" noChangeAspect="1" noMove="1" noResize="1" noEditPoints="1" noAdjustHandles="1" noChangeArrowheads="1" noChangeShapeType="1" noTextEdit="1"/>
+          </p:cNvSpPr>
+          <p:nvPr>
+            <p:extLst>
+              <p:ext uri="{386F3935-93C4-4BCD-93E2-E3B085C9AB24}">
+                <p16:designElem xmlns:p16="http://schemas.microsoft.com/office/powerpoint/2015/main" val="1"/>
+              </p:ext>
+            </p:extLst>
+          </p:nvPr>
+        </p:nvSpPr>
+        <p:spPr bwMode="ltGray">
+          <a:xfrm>
+            <a:off x="4708357" y="3509963"/>
+            <a:ext cx="7092215" cy="2967839"/>
+          </a:xfrm>
+          <a:prstGeom prst="rect">
+            <a:avLst/>
+          </a:prstGeom>
+          <a:solidFill>
+            <a:srgbClr val="404040"/>
+          </a:solidFill>
+          <a:ln w="127000" cap="sq" cmpd="thinThick">
+            <a:solidFill>
+              <a:srgbClr val="404040"/>
+            </a:solidFill>
+          </a:ln>
+        </p:spPr>
+        <p:style>
+          <a:lnRef idx="2">
+            <a:schemeClr val="accent1">
+              <a:shade val="50000"/>
+            </a:schemeClr>
+          </a:lnRef>
+          <a:fillRef idx="1">
+            <a:schemeClr val="accent1"/>
+          </a:fillRef>
+          <a:effectRef idx="0">
+            <a:schemeClr val="accent1"/>
+          </a:effectRef>
+          <a:fontRef idx="minor">
+            <a:schemeClr val="lt1"/>
+          </a:fontRef>
+        </p:style>
+        <p:txBody>
+          <a:bodyPr rtlCol="0" anchor="ctr"/>
+          <a:lstStyle/>
+          <a:p>
+            <a:pPr algn="ctr"/>
+            <a:endParaRPr lang="en-US" dirty="0"/>
+          </a:p>
+        </p:txBody>
+      </p:sp>
+      <p:sp>
+        <p:nvSpPr>
+          <p:cNvPr id="2" name="Title 1">
+            <a:extLst>
+              <a:ext uri="{FF2B5EF4-FFF2-40B4-BE49-F238E27FC236}">
+                <a16:creationId xmlns:a16="http://schemas.microsoft.com/office/drawing/2014/main" id="{8A248E08-59D4-254D-AB8C-721B57F8222C}"/>
+              </a:ext>
+            </a:extLst>
+          </p:cNvPr>
+          <p:cNvSpPr>
+            <a:spLocks noGrp="1"/>
+          </p:cNvSpPr>
+          <p:nvPr>
+            <p:ph type="title"/>
+          </p:nvPr>
+        </p:nvSpPr>
+        <p:spPr>
+          <a:xfrm>
+            <a:off x="5021821" y="3812954"/>
+            <a:ext cx="6465287" cy="1516014"/>
+          </a:xfrm>
+        </p:spPr>
+        <p:txBody>
+          <a:bodyPr vert="horz" lIns="91440" tIns="45720" rIns="91440" bIns="45720" rtlCol="0" anchor="b">
+            <a:normAutofit/>
+          </a:bodyPr>
+          <a:lstStyle/>
+          <a:p>
+            <a:r>
+              <a:rPr lang="en-US" sz="3400" kern="1200" dirty="0">
+                <a:solidFill>
+                  <a:srgbClr val="FFFFFF"/>
+                </a:solidFill>
+                <a:latin typeface="+mj-lt"/>
+                <a:ea typeface="+mj-ea"/>
+                <a:cs typeface="+mj-cs"/>
+              </a:rPr>
+              <a:t>Does a hot summer mean more crime? </a:t>
+            </a:r>
+            <a:br>
+              <a:rPr lang="en-US" sz="3400" kern="1200" dirty="0">
+                <a:solidFill>
+                  <a:srgbClr val="FFFFFF"/>
+                </a:solidFill>
+                <a:latin typeface="+mj-lt"/>
+                <a:ea typeface="+mj-ea"/>
+                <a:cs typeface="+mj-cs"/>
+              </a:rPr>
+            </a:br>
+            <a:r>
+              <a:rPr lang="en-US" sz="3400" kern="1200" dirty="0">
+                <a:solidFill>
+                  <a:srgbClr val="FFFFFF"/>
+                </a:solidFill>
+                <a:latin typeface="+mj-lt"/>
+                <a:ea typeface="+mj-ea"/>
+                <a:cs typeface="+mj-cs"/>
+              </a:rPr>
+              <a:t>Here's what the data shows: </a:t>
+            </a:r>
+          </a:p>
+        </p:txBody>
+      </p:sp>
+      <p:pic>
+        <p:nvPicPr>
+          <p:cNvPr id="4" name="Picture 3">
+            <a:extLst>
+              <a:ext uri="{FF2B5EF4-FFF2-40B4-BE49-F238E27FC236}">
+                <a16:creationId xmlns:a16="http://schemas.microsoft.com/office/drawing/2014/main" id="{FD4C3B98-FC5F-6541-8DB6-FD4645C56E7F}"/>
+              </a:ext>
+            </a:extLst>
+          </p:cNvPr>
+          <p:cNvPicPr>
+            <a:picLocks noChangeAspect="1"/>
+          </p:cNvPicPr>
+          <p:nvPr/>
+        </p:nvPicPr>
+        <p:blipFill rotWithShape="1">
+          <a:blip r:embed="rId2">
+            <a:extLst>
+              <a:ext uri="{28A0092B-C50C-407E-A947-70E740481C1C}">
+                <a14:useLocalDpi xmlns:a14="http://schemas.microsoft.com/office/drawing/2010/main" val="0"/>
+              </a:ext>
+            </a:extLst>
+          </a:blip>
+          <a:srcRect l="732" r="3941" b="1"/>
+          <a:stretch/>
+        </p:blipFill>
+        <p:spPr>
+          <a:xfrm>
+            <a:off x="317635" y="321733"/>
+            <a:ext cx="4151681" cy="3026834"/>
+          </a:xfrm>
+          <a:prstGeom prst="rect">
+            <a:avLst/>
+          </a:prstGeom>
+        </p:spPr>
+      </p:pic>
+      <p:pic>
+        <p:nvPicPr>
+          <p:cNvPr id="6" name="Picture 5">
+            <a:extLst>
+              <a:ext uri="{FF2B5EF4-FFF2-40B4-BE49-F238E27FC236}">
+                <a16:creationId xmlns:a16="http://schemas.microsoft.com/office/drawing/2014/main" id="{7E3EA373-6999-7340-AE4E-FF7B33ED253C}"/>
+              </a:ext>
+            </a:extLst>
+          </p:cNvPr>
+          <p:cNvPicPr>
+            <a:picLocks noChangeAspect="1"/>
+          </p:cNvPicPr>
+          <p:nvPr/>
+        </p:nvPicPr>
+        <p:blipFill rotWithShape="1">
+          <a:blip r:embed="rId3">
+            <a:extLst>
+              <a:ext uri="{28A0092B-C50C-407E-A947-70E740481C1C}">
+                <a14:useLocalDpi xmlns:a14="http://schemas.microsoft.com/office/drawing/2010/main" val="0"/>
+              </a:ext>
+            </a:extLst>
+          </a:blip>
+          <a:srcRect l="4174" r="4833" b="2"/>
+          <a:stretch/>
+        </p:blipFill>
+        <p:spPr>
+          <a:xfrm>
+            <a:off x="4638955" y="321733"/>
+            <a:ext cx="3539976" cy="2985818"/>
+          </a:xfrm>
+          <a:prstGeom prst="rect">
+            <a:avLst/>
+          </a:prstGeom>
+        </p:spPr>
+      </p:pic>
+      <p:pic>
+        <p:nvPicPr>
+          <p:cNvPr id="10" name="Picture 9">
+            <a:extLst>
+              <a:ext uri="{FF2B5EF4-FFF2-40B4-BE49-F238E27FC236}">
+                <a16:creationId xmlns:a16="http://schemas.microsoft.com/office/drawing/2014/main" id="{DE0774BC-F85D-2F48-8755-66DE8B41944D}"/>
+              </a:ext>
+            </a:extLst>
+          </p:cNvPr>
+          <p:cNvPicPr>
+            <a:picLocks noChangeAspect="1"/>
+          </p:cNvPicPr>
+          <p:nvPr/>
+        </p:nvPicPr>
+        <p:blipFill rotWithShape="1">
+          <a:blip r:embed="rId4">
+            <a:extLst>
+              <a:ext uri="{28A0092B-C50C-407E-A947-70E740481C1C}">
+                <a14:useLocalDpi xmlns:a14="http://schemas.microsoft.com/office/drawing/2010/main" val="0"/>
+              </a:ext>
+            </a:extLst>
+          </a:blip>
+          <a:srcRect r="229" b="2"/>
+          <a:stretch/>
+        </p:blipFill>
+        <p:spPr>
+          <a:xfrm>
+            <a:off x="8348570" y="321734"/>
+            <a:ext cx="3535590" cy="2985818"/>
+          </a:xfrm>
+          <a:prstGeom prst="rect">
+            <a:avLst/>
+          </a:prstGeom>
+        </p:spPr>
+      </p:pic>
+      <p:cxnSp>
+        <p:nvCxnSpPr>
+          <p:cNvPr id="17" name="Straight Connector 16">
+            <a:extLst>
+              <a:ext uri="{FF2B5EF4-FFF2-40B4-BE49-F238E27FC236}">
+                <a16:creationId xmlns:a16="http://schemas.microsoft.com/office/drawing/2014/main" id="{5C34627B-48E6-4F4D-B843-97717A86B490}"/>
+              </a:ext>
+              <a:ext uri="{C183D7F6-B498-43B3-948B-1728B52AA6E4}">
+                <adec:decorative xmlns:adec="http://schemas.microsoft.com/office/drawing/2017/decorative" val="1"/>
+              </a:ext>
+            </a:extLst>
+          </p:cNvPr>
+          <p:cNvCxnSpPr>
+            <a:cxnSpLocks noGrp="1" noRot="1" noChangeAspect="1" noMove="1" noResize="1" noEditPoints="1" noAdjustHandles="1" noChangeArrowheads="1" noChangeShapeType="1"/>
+          </p:cNvCxnSpPr>
+          <p:nvPr>
+            <p:extLst>
+              <p:ext uri="{386F3935-93C4-4BCD-93E2-E3B085C9AB24}">
+                <p16:designElem xmlns:p16="http://schemas.microsoft.com/office/powerpoint/2015/main" val="1"/>
+              </p:ext>
+            </p:extLst>
+          </p:nvPr>
+        </p:nvCxnSpPr>
+        <p:spPr>
+          <a:xfrm>
+            <a:off x="5138287" y="5443086"/>
+            <a:ext cx="6400800" cy="0"/>
+          </a:xfrm>
+          <a:prstGeom prst="line">
+            <a:avLst/>
+          </a:prstGeom>
+          <a:ln w="22225">
+            <a:solidFill>
+              <a:srgbClr val="D9D9D9"/>
+            </a:solidFill>
+          </a:ln>
+        </p:spPr>
+        <p:style>
+          <a:lnRef idx="1">
+            <a:schemeClr val="accent1"/>
+          </a:lnRef>
+          <a:fillRef idx="0">
+            <a:schemeClr val="accent1"/>
+          </a:fillRef>
+          <a:effectRef idx="0">
+            <a:schemeClr val="accent1"/>
+          </a:effectRef>
+          <a:fontRef idx="minor">
+            <a:schemeClr val="tx1"/>
+          </a:fontRef>
+        </p:style>
+      </p:cxnSp>
+      <p:pic>
+        <p:nvPicPr>
+          <p:cNvPr id="8" name="Picture 7">
+            <a:extLst>
+              <a:ext uri="{FF2B5EF4-FFF2-40B4-BE49-F238E27FC236}">
+                <a16:creationId xmlns:a16="http://schemas.microsoft.com/office/drawing/2014/main" id="{5BEBFBA0-D56F-B947-9923-E7CC05B024FD}"/>
+              </a:ext>
+            </a:extLst>
+          </p:cNvPr>
+          <p:cNvPicPr>
+            <a:picLocks noChangeAspect="1"/>
+          </p:cNvPicPr>
+          <p:nvPr/>
+        </p:nvPicPr>
+        <p:blipFill rotWithShape="1">
+          <a:blip r:embed="rId5">
+            <a:extLst>
+              <a:ext uri="{28A0092B-C50C-407E-A947-70E740481C1C}">
+                <a14:useLocalDpi xmlns:a14="http://schemas.microsoft.com/office/drawing/2010/main" val="0"/>
+              </a:ext>
+            </a:extLst>
+          </a:blip>
+          <a:srcRect t="9831" r="-5" b="2822"/>
+          <a:stretch/>
+        </p:blipFill>
+        <p:spPr>
+          <a:xfrm>
+            <a:off x="317635" y="3509433"/>
+            <a:ext cx="4160452" cy="3026833"/>
+          </a:xfrm>
+          <a:prstGeom prst="rect">
+            <a:avLst/>
+          </a:prstGeom>
+        </p:spPr>
+      </p:pic>
+    </p:spTree>
+    <p:extLst>
+      <p:ext uri="{BB962C8B-B14F-4D97-AF65-F5344CB8AC3E}">
+        <p14:creationId xmlns:p14="http://schemas.microsoft.com/office/powerpoint/2010/main" val="2868352188"/>
+      </p:ext>
+    </p:extLst>
+  </p:cSld>
+  <p:clrMapOvr>
+    <a:masterClrMapping/>
+  </p:clrMapOvr>
+</p:sld>
+</file>
+
+<file path=ppt/slides/slide13.xml><?xml version="1.0" encoding="utf-8"?>
+<p:sld xmlns:a="http://schemas.openxmlformats.org/drawingml/2006/main" xmlns:r="http://schemas.openxmlformats.org/officeDocument/2006/relationships" xmlns:p="http://schemas.openxmlformats.org/presentationml/2006/main">
+  <p:cSld>
+    <p:bg>
+      <p:bgPr>
+        <a:solidFill>
+          <a:schemeClr val="bg1"/>
+        </a:solidFill>
+        <a:effectLst/>
+      </p:bgPr>
+    </p:bg>
+    <p:spTree>
+      <p:nvGrpSpPr>
+        <p:cNvPr id="1" name=""/>
+        <p:cNvGrpSpPr/>
+        <p:nvPr/>
+      </p:nvGrpSpPr>
+      <p:grpSpPr>
+        <a:xfrm>
+          <a:off x="0" y="0"/>
+          <a:ext cx="0" cy="0"/>
+          <a:chOff x="0" y="0"/>
+          <a:chExt cx="0" cy="0"/>
+        </a:xfrm>
+      </p:grpSpPr>
+      <p:sp>
+        <p:nvSpPr>
           <p:cNvPr id="2" name="Title 1">
             <a:extLst>
               <a:ext uri="{FF2B5EF4-FFF2-40B4-BE49-F238E27FC236}">
@@ -3877,7 +4856,7 @@
 </p:sld>
 </file>
 
-<file path=ppt/slides/slide11.xml><?xml version="1.0" encoding="utf-8"?>
+<file path=ppt/slides/slide14.xml><?xml version="1.0" encoding="utf-8"?>
 <p:sld xmlns:a="http://schemas.openxmlformats.org/drawingml/2006/main" xmlns:r="http://schemas.openxmlformats.org/officeDocument/2006/relationships" xmlns:p="http://schemas.openxmlformats.org/presentationml/2006/main">
   <p:cSld>
     <p:spTree>
@@ -4186,6 +5165,92 @@
     <p:extLst>
       <p:ext uri="{BB962C8B-B14F-4D97-AF65-F5344CB8AC3E}">
         <p14:creationId xmlns:p14="http://schemas.microsoft.com/office/powerpoint/2010/main" val="918526572"/>
+      </p:ext>
+    </p:extLst>
+  </p:cSld>
+  <p:clrMapOvr>
+    <a:masterClrMapping/>
+  </p:clrMapOvr>
+</p:sld>
+</file>
+
+<file path=ppt/slides/slide15.xml><?xml version="1.0" encoding="utf-8"?>
+<p:sld xmlns:a="http://schemas.openxmlformats.org/drawingml/2006/main" xmlns:r="http://schemas.openxmlformats.org/officeDocument/2006/relationships" xmlns:p="http://schemas.openxmlformats.org/presentationml/2006/main">
+  <p:cSld>
+    <p:spTree>
+      <p:nvGrpSpPr>
+        <p:cNvPr id="1" name=""/>
+        <p:cNvGrpSpPr/>
+        <p:nvPr/>
+      </p:nvGrpSpPr>
+      <p:grpSpPr>
+        <a:xfrm>
+          <a:off x="0" y="0"/>
+          <a:ext cx="0" cy="0"/>
+          <a:chOff x="0" y="0"/>
+          <a:chExt cx="0" cy="0"/>
+        </a:xfrm>
+      </p:grpSpPr>
+      <p:sp>
+        <p:nvSpPr>
+          <p:cNvPr id="2" name="Title 1">
+            <a:extLst>
+              <a:ext uri="{FF2B5EF4-FFF2-40B4-BE49-F238E27FC236}">
+                <a16:creationId xmlns:a16="http://schemas.microsoft.com/office/drawing/2014/main" id="{33EA19B7-68FD-0E4C-A29C-AD7437514EDA}"/>
+              </a:ext>
+            </a:extLst>
+          </p:cNvPr>
+          <p:cNvSpPr>
+            <a:spLocks noGrp="1"/>
+          </p:cNvSpPr>
+          <p:nvPr>
+            <p:ph type="title"/>
+          </p:nvPr>
+        </p:nvSpPr>
+        <p:spPr/>
+        <p:txBody>
+          <a:bodyPr>
+            <a:normAutofit/>
+          </a:bodyPr>
+          <a:lstStyle/>
+          <a:p>
+            <a:pPr algn="ctr"/>
+            <a:r>
+              <a:rPr lang="en-US" sz="2400" dirty="0"/>
+              <a:t>Discuss the implications of your findings. This is where you get to have an open-ended discussion about what your findings "mean".</a:t>
+            </a:r>
+          </a:p>
+        </p:txBody>
+      </p:sp>
+      <p:sp>
+        <p:nvSpPr>
+          <p:cNvPr id="3" name="Content Placeholder 2">
+            <a:extLst>
+              <a:ext uri="{FF2B5EF4-FFF2-40B4-BE49-F238E27FC236}">
+                <a16:creationId xmlns:a16="http://schemas.microsoft.com/office/drawing/2014/main" id="{B24B9234-FC84-3048-916A-ED4CFEA49595}"/>
+              </a:ext>
+            </a:extLst>
+          </p:cNvPr>
+          <p:cNvSpPr>
+            <a:spLocks noGrp="1"/>
+          </p:cNvSpPr>
+          <p:nvPr>
+            <p:ph idx="1"/>
+          </p:nvPr>
+        </p:nvSpPr>
+        <p:spPr/>
+        <p:txBody>
+          <a:bodyPr/>
+          <a:lstStyle/>
+          <a:p>
+            <a:endParaRPr lang="en-US" dirty="0"/>
+          </a:p>
+        </p:txBody>
+      </p:sp>
+    </p:spTree>
+    <p:extLst>
+      <p:ext uri="{BB962C8B-B14F-4D97-AF65-F5344CB8AC3E}">
+        <p14:creationId xmlns:p14="http://schemas.microsoft.com/office/powerpoint/2010/main" val="2008184770"/>
       </p:ext>
     </p:extLst>
   </p:cSld>

</xml_diff>